<commit_message>
finished slide for flowcharts
</commit_message>
<xml_diff>
--- a/SPRING 20/CSE 101/Course Materials/algo_pseudo_flowcharts_part2.pptx
+++ b/SPRING 20/CSE 101/Course Materials/algo_pseudo_flowcharts_part2.pptx
@@ -9,15 +9,22 @@
     <p:sldId id="257" r:id="rId3"/>
     <p:sldId id="268" r:id="rId4"/>
     <p:sldId id="284" r:id="rId5"/>
-    <p:sldId id="285" r:id="rId6"/>
-    <p:sldId id="286" r:id="rId7"/>
-    <p:sldId id="278" r:id="rId8"/>
-    <p:sldId id="279" r:id="rId9"/>
-    <p:sldId id="280" r:id="rId10"/>
-    <p:sldId id="281" r:id="rId11"/>
-    <p:sldId id="282" r:id="rId12"/>
-    <p:sldId id="283" r:id="rId13"/>
-    <p:sldId id="266" r:id="rId14"/>
+    <p:sldId id="287" r:id="rId6"/>
+    <p:sldId id="285" r:id="rId7"/>
+    <p:sldId id="288" r:id="rId8"/>
+    <p:sldId id="289" r:id="rId9"/>
+    <p:sldId id="290" r:id="rId10"/>
+    <p:sldId id="286" r:id="rId11"/>
+    <p:sldId id="291" r:id="rId12"/>
+    <p:sldId id="292" r:id="rId13"/>
+    <p:sldId id="293" r:id="rId14"/>
+    <p:sldId id="278" r:id="rId15"/>
+    <p:sldId id="279" r:id="rId16"/>
+    <p:sldId id="280" r:id="rId17"/>
+    <p:sldId id="281" r:id="rId18"/>
+    <p:sldId id="282" r:id="rId19"/>
+    <p:sldId id="283" r:id="rId20"/>
+    <p:sldId id="266" r:id="rId21"/>
   </p:sldIdLst>
   <p:sldSz cx="12192000" cy="6858000"/>
   <p:notesSz cx="6858000" cy="9144000"/>
@@ -5760,7 +5767,7 @@
           <p:cNvPr id="2" name="Title 1">
             <a:extLst>
               <a:ext uri="{FF2B5EF4-FFF2-40B4-BE49-F238E27FC236}">
-                <a16:creationId xmlns:a16="http://schemas.microsoft.com/office/drawing/2014/main" xmlns="" id="{06A77D37-ABF2-4957-92A3-32D520D84181}"/>
+                <a16:creationId xmlns:a16="http://schemas.microsoft.com/office/drawing/2014/main" id="{06A77D37-ABF2-4957-92A3-32D520D84181}"/>
               </a:ext>
             </a:extLst>
           </p:cNvPr>
@@ -5788,7 +5795,7 @@
           <p:cNvPr id="3" name="Subtitle 2">
             <a:extLst>
               <a:ext uri="{FF2B5EF4-FFF2-40B4-BE49-F238E27FC236}">
-                <a16:creationId xmlns:a16="http://schemas.microsoft.com/office/drawing/2014/main" xmlns="" id="{C5C01608-4FB7-41D0-A725-F9B22E2CC1D3}"/>
+                <a16:creationId xmlns:a16="http://schemas.microsoft.com/office/drawing/2014/main" id="{C5C01608-4FB7-41D0-A725-F9B22E2CC1D3}"/>
               </a:ext>
             </a:extLst>
           </p:cNvPr>
@@ -5806,13 +5813,8 @@
           <a:p>
             <a:r>
               <a:rPr lang="en-SG" dirty="0"/>
-              <a:t>Part </a:t>
-            </a:r>
-            <a:r>
-              <a:rPr lang="en-SG" dirty="0" smtClean="0"/>
-              <a:t>II (Flowchart)</a:t>
-            </a:r>
-            <a:endParaRPr lang="en-SG" dirty="0"/>
+              <a:t>Part II (Flowchart)</a:t>
+            </a:r>
           </a:p>
         </p:txBody>
       </p:sp>
@@ -5851,7 +5853,7 @@
           <p:cNvPr id="2" name="Title 1">
             <a:extLst>
               <a:ext uri="{FF2B5EF4-FFF2-40B4-BE49-F238E27FC236}">
-                <a16:creationId xmlns:a16="http://schemas.microsoft.com/office/drawing/2014/main" xmlns="" id="{852EC85B-4C5A-452F-BFA9-01CCA4D36D5A}"/>
+                <a16:creationId xmlns:a16="http://schemas.microsoft.com/office/drawing/2014/main" id="{8DBD61DA-85D0-4639-AFCE-F80F48521BF1}"/>
               </a:ext>
             </a:extLst>
           </p:cNvPr>
@@ -5869,19 +5871,514 @@
           <a:p>
             <a:r>
               <a:rPr lang="en-SG" dirty="0"/>
-              <a:t>Exercise 4</a:t>
-            </a:r>
-          </a:p>
-        </p:txBody>
-      </p:sp>
-      <mc:AlternateContent xmlns:mc="http://schemas.openxmlformats.org/markup-compatibility/2006" xmlns:a14="http://schemas.microsoft.com/office/drawing/2010/main">
-        <mc:Choice Requires="a14">
+              <a:t>Contents</a:t>
+            </a:r>
+          </a:p>
+        </p:txBody>
+      </p:sp>
+      <p:sp>
+        <p:nvSpPr>
+          <p:cNvPr id="3" name="Content Placeholder 2">
+            <a:extLst>
+              <a:ext uri="{FF2B5EF4-FFF2-40B4-BE49-F238E27FC236}">
+                <a16:creationId xmlns:a16="http://schemas.microsoft.com/office/drawing/2014/main" id="{42D4F774-BAD3-45DD-BF52-03C72E771D92}"/>
+              </a:ext>
+            </a:extLst>
+          </p:cNvPr>
+          <p:cNvSpPr>
+            <a:spLocks noGrp="1"/>
+          </p:cNvSpPr>
+          <p:nvPr>
+            <p:ph idx="1"/>
+          </p:nvPr>
+        </p:nvSpPr>
+        <p:spPr/>
+        <p:txBody>
+          <a:bodyPr/>
+          <a:lstStyle/>
+          <a:p>
+            <a:r>
+              <a:rPr lang="en-SG" dirty="0"/>
+              <a:t>Definition</a:t>
+            </a:r>
+          </a:p>
+          <a:p>
+            <a:r>
+              <a:rPr lang="en-SG" dirty="0"/>
+              <a:t>Symbols</a:t>
+            </a:r>
+          </a:p>
+          <a:p>
+            <a:r>
+              <a:rPr lang="en-SG" dirty="0"/>
+              <a:t>Flowchart constructs</a:t>
+            </a:r>
+          </a:p>
+          <a:p>
+            <a:r>
+              <a:rPr lang="en-SG" b="1" dirty="0"/>
+              <a:t>Examples and Exercises</a:t>
+            </a:r>
+          </a:p>
+        </p:txBody>
+      </p:sp>
+    </p:spTree>
+    <p:extLst>
+      <p:ext uri="{BB962C8B-B14F-4D97-AF65-F5344CB8AC3E}">
+        <p14:creationId xmlns:p14="http://schemas.microsoft.com/office/powerpoint/2010/main" val="3183918338"/>
+      </p:ext>
+    </p:extLst>
+  </p:cSld>
+  <p:clrMapOvr>
+    <a:masterClrMapping/>
+  </p:clrMapOvr>
+</p:sld>
+</file>
+
+<file path=ppt/slides/slide11.xml><?xml version="1.0" encoding="utf-8"?>
+<p:sld xmlns:a="http://schemas.openxmlformats.org/drawingml/2006/main" xmlns:r="http://schemas.openxmlformats.org/officeDocument/2006/relationships" xmlns:p="http://schemas.openxmlformats.org/presentationml/2006/main">
+  <p:cSld>
+    <p:spTree>
+      <p:nvGrpSpPr>
+        <p:cNvPr id="1" name=""/>
+        <p:cNvGrpSpPr/>
+        <p:nvPr/>
+      </p:nvGrpSpPr>
+      <p:grpSpPr>
+        <a:xfrm>
+          <a:off x="0" y="0"/>
+          <a:ext cx="0" cy="0"/>
+          <a:chOff x="0" y="0"/>
+          <a:chExt cx="0" cy="0"/>
+        </a:xfrm>
+      </p:grpSpPr>
+      <p:sp>
+        <p:nvSpPr>
+          <p:cNvPr id="2" name="Title 1">
+            <a:extLst>
+              <a:ext uri="{FF2B5EF4-FFF2-40B4-BE49-F238E27FC236}">
+                <a16:creationId xmlns:a16="http://schemas.microsoft.com/office/drawing/2014/main" id="{91341132-A3F0-4DEB-9B7A-92290AC01C2E}"/>
+              </a:ext>
+            </a:extLst>
+          </p:cNvPr>
+          <p:cNvSpPr>
+            <a:spLocks noGrp="1"/>
+          </p:cNvSpPr>
+          <p:nvPr>
+            <p:ph type="title"/>
+          </p:nvPr>
+        </p:nvSpPr>
+        <p:spPr/>
+        <p:txBody>
+          <a:bodyPr/>
+          <a:lstStyle/>
+          <a:p>
+            <a:r>
+              <a:rPr lang="en-SG" dirty="0"/>
+              <a:t>Example 1</a:t>
+            </a:r>
+          </a:p>
+        </p:txBody>
+      </p:sp>
+      <p:sp>
+        <p:nvSpPr>
+          <p:cNvPr id="3" name="Content Placeholder 2">
+            <a:extLst>
+              <a:ext uri="{FF2B5EF4-FFF2-40B4-BE49-F238E27FC236}">
+                <a16:creationId xmlns:a16="http://schemas.microsoft.com/office/drawing/2014/main" id="{8F8C1781-810F-4A25-9748-A8F61B7BBBD5}"/>
+              </a:ext>
+            </a:extLst>
+          </p:cNvPr>
+          <p:cNvSpPr>
+            <a:spLocks noGrp="1"/>
+          </p:cNvSpPr>
+          <p:nvPr>
+            <p:ph sz="half" idx="1"/>
+          </p:nvPr>
+        </p:nvSpPr>
+        <p:spPr/>
+        <p:txBody>
+          <a:bodyPr/>
+          <a:lstStyle/>
+          <a:p>
+            <a:r>
+              <a:rPr lang="en-US" dirty="0"/>
+              <a:t>Flowchart to find the sum of two numbers</a:t>
+            </a:r>
+          </a:p>
+          <a:p>
+            <a:endParaRPr lang="en-US" dirty="0"/>
+          </a:p>
+          <a:p>
+            <a:endParaRPr lang="en-SG" dirty="0"/>
+          </a:p>
+        </p:txBody>
+      </p:sp>
+      <p:pic>
+        <p:nvPicPr>
+          <p:cNvPr id="6" name="Content Placeholder 5">
+            <a:extLst>
+              <a:ext uri="{FF2B5EF4-FFF2-40B4-BE49-F238E27FC236}">
+                <a16:creationId xmlns:a16="http://schemas.microsoft.com/office/drawing/2014/main" id="{5EAD0A79-0B22-43FE-9161-8E42080ACF62}"/>
+              </a:ext>
+            </a:extLst>
+          </p:cNvPr>
+          <p:cNvPicPr>
+            <a:picLocks noGrp="1" noChangeAspect="1"/>
+          </p:cNvPicPr>
+          <p:nvPr>
+            <p:ph sz="half" idx="2"/>
+          </p:nvPr>
+        </p:nvPicPr>
+        <p:blipFill>
+          <a:blip r:embed="rId2">
+            <a:extLst>
+              <a:ext uri="{28A0092B-C50C-407E-A947-70E740481C1C}">
+                <a14:useLocalDpi xmlns:a14="http://schemas.microsoft.com/office/drawing/2010/main" val="0"/>
+              </a:ext>
+            </a:extLst>
+          </a:blip>
+          <a:srcRect/>
+          <a:stretch/>
+        </p:blipFill>
+        <p:spPr>
+          <a:xfrm>
+            <a:off x="9392562" y="902970"/>
+            <a:ext cx="1497330" cy="5052060"/>
+          </a:xfrm>
+          <a:prstGeom prst="rect">
+            <a:avLst/>
+          </a:prstGeom>
+          <a:solidFill>
+            <a:schemeClr val="tx1"/>
+          </a:solidFill>
+        </p:spPr>
+      </p:pic>
+    </p:spTree>
+    <p:extLst>
+      <p:ext uri="{BB962C8B-B14F-4D97-AF65-F5344CB8AC3E}">
+        <p14:creationId xmlns:p14="http://schemas.microsoft.com/office/powerpoint/2010/main" val="619784119"/>
+      </p:ext>
+    </p:extLst>
+  </p:cSld>
+  <p:clrMapOvr>
+    <a:masterClrMapping/>
+  </p:clrMapOvr>
+</p:sld>
+</file>
+
+<file path=ppt/slides/slide12.xml><?xml version="1.0" encoding="utf-8"?>
+<p:sld xmlns:a="http://schemas.openxmlformats.org/drawingml/2006/main" xmlns:r="http://schemas.openxmlformats.org/officeDocument/2006/relationships" xmlns:p="http://schemas.openxmlformats.org/presentationml/2006/main">
+  <p:cSld>
+    <p:spTree>
+      <p:nvGrpSpPr>
+        <p:cNvPr id="1" name=""/>
+        <p:cNvGrpSpPr/>
+        <p:nvPr/>
+      </p:nvGrpSpPr>
+      <p:grpSpPr>
+        <a:xfrm>
+          <a:off x="0" y="0"/>
+          <a:ext cx="0" cy="0"/>
+          <a:chOff x="0" y="0"/>
+          <a:chExt cx="0" cy="0"/>
+        </a:xfrm>
+      </p:grpSpPr>
+      <p:sp>
+        <p:nvSpPr>
+          <p:cNvPr id="2" name="Title 1">
+            <a:extLst>
+              <a:ext uri="{FF2B5EF4-FFF2-40B4-BE49-F238E27FC236}">
+                <a16:creationId xmlns:a16="http://schemas.microsoft.com/office/drawing/2014/main" id="{91341132-A3F0-4DEB-9B7A-92290AC01C2E}"/>
+              </a:ext>
+            </a:extLst>
+          </p:cNvPr>
+          <p:cNvSpPr>
+            <a:spLocks noGrp="1"/>
+          </p:cNvSpPr>
+          <p:nvPr>
+            <p:ph type="title"/>
+          </p:nvPr>
+        </p:nvSpPr>
+        <p:spPr/>
+        <p:txBody>
+          <a:bodyPr/>
+          <a:lstStyle/>
+          <a:p>
+            <a:r>
+              <a:rPr lang="en-SG" dirty="0"/>
+              <a:t>Example 2</a:t>
+            </a:r>
+          </a:p>
+        </p:txBody>
+      </p:sp>
+      <p:sp>
+        <p:nvSpPr>
+          <p:cNvPr id="3" name="Content Placeholder 2">
+            <a:extLst>
+              <a:ext uri="{FF2B5EF4-FFF2-40B4-BE49-F238E27FC236}">
+                <a16:creationId xmlns:a16="http://schemas.microsoft.com/office/drawing/2014/main" id="{8F8C1781-810F-4A25-9748-A8F61B7BBBD5}"/>
+              </a:ext>
+            </a:extLst>
+          </p:cNvPr>
+          <p:cNvSpPr>
+            <a:spLocks noGrp="1"/>
+          </p:cNvSpPr>
+          <p:nvPr>
+            <p:ph sz="half" idx="1"/>
+          </p:nvPr>
+        </p:nvSpPr>
+        <p:spPr/>
+        <p:txBody>
+          <a:bodyPr/>
+          <a:lstStyle/>
+          <a:p>
+            <a:r>
+              <a:rPr lang="en-US" dirty="0"/>
+              <a:t>Flowchart to find the smallest of two numbers</a:t>
+            </a:r>
+          </a:p>
+          <a:p>
+            <a:endParaRPr lang="en-US" dirty="0"/>
+          </a:p>
+          <a:p>
+            <a:endParaRPr lang="en-SG" dirty="0"/>
+          </a:p>
+        </p:txBody>
+      </p:sp>
+      <p:pic>
+        <p:nvPicPr>
+          <p:cNvPr id="8" name="Content Placeholder 7">
+            <a:extLst>
+              <a:ext uri="{FF2B5EF4-FFF2-40B4-BE49-F238E27FC236}">
+                <a16:creationId xmlns:a16="http://schemas.microsoft.com/office/drawing/2014/main" id="{B191A469-12ED-40C0-8F46-F4647CA16157}"/>
+              </a:ext>
+            </a:extLst>
+          </p:cNvPr>
+          <p:cNvPicPr>
+            <a:picLocks noGrp="1" noChangeAspect="1"/>
+          </p:cNvPicPr>
+          <p:nvPr>
+            <p:ph sz="half" idx="2"/>
+          </p:nvPr>
+        </p:nvPicPr>
+        <p:blipFill>
+          <a:blip r:embed="rId2">
+            <a:extLst>
+              <a:ext uri="{28A0092B-C50C-407E-A947-70E740481C1C}">
+                <a14:useLocalDpi xmlns:a14="http://schemas.microsoft.com/office/drawing/2010/main" val="0"/>
+              </a:ext>
+            </a:extLst>
+          </a:blip>
+          <a:srcRect/>
+          <a:stretch/>
+        </p:blipFill>
+        <p:spPr>
+          <a:xfrm>
+            <a:off x="6094412" y="1017270"/>
+            <a:ext cx="5726430" cy="4823460"/>
+          </a:xfrm>
+          <a:solidFill>
+            <a:schemeClr val="tx1"/>
+          </a:solidFill>
+        </p:spPr>
+      </p:pic>
+    </p:spTree>
+    <p:extLst>
+      <p:ext uri="{BB962C8B-B14F-4D97-AF65-F5344CB8AC3E}">
+        <p14:creationId xmlns:p14="http://schemas.microsoft.com/office/powerpoint/2010/main" val="861481335"/>
+      </p:ext>
+    </p:extLst>
+  </p:cSld>
+  <p:clrMapOvr>
+    <a:masterClrMapping/>
+  </p:clrMapOvr>
+</p:sld>
+</file>
+
+<file path=ppt/slides/slide13.xml><?xml version="1.0" encoding="utf-8"?>
+<p:sld xmlns:a="http://schemas.openxmlformats.org/drawingml/2006/main" xmlns:r="http://schemas.openxmlformats.org/officeDocument/2006/relationships" xmlns:p="http://schemas.openxmlformats.org/presentationml/2006/main">
+  <p:cSld>
+    <p:spTree>
+      <p:nvGrpSpPr>
+        <p:cNvPr id="1" name=""/>
+        <p:cNvGrpSpPr/>
+        <p:nvPr/>
+      </p:nvGrpSpPr>
+      <p:grpSpPr>
+        <a:xfrm>
+          <a:off x="0" y="0"/>
+          <a:ext cx="0" cy="0"/>
+          <a:chOff x="0" y="0"/>
+          <a:chExt cx="0" cy="0"/>
+        </a:xfrm>
+      </p:grpSpPr>
+      <p:sp>
+        <p:nvSpPr>
+          <p:cNvPr id="2" name="Title 1">
+            <a:extLst>
+              <a:ext uri="{FF2B5EF4-FFF2-40B4-BE49-F238E27FC236}">
+                <a16:creationId xmlns:a16="http://schemas.microsoft.com/office/drawing/2014/main" id="{91341132-A3F0-4DEB-9B7A-92290AC01C2E}"/>
+              </a:ext>
+            </a:extLst>
+          </p:cNvPr>
+          <p:cNvSpPr>
+            <a:spLocks noGrp="1"/>
+          </p:cNvSpPr>
+          <p:nvPr>
+            <p:ph type="title"/>
+          </p:nvPr>
+        </p:nvSpPr>
+        <p:spPr/>
+        <p:txBody>
+          <a:bodyPr/>
+          <a:lstStyle/>
+          <a:p>
+            <a:r>
+              <a:rPr lang="en-SG" dirty="0"/>
+              <a:t>Example 3</a:t>
+            </a:r>
+          </a:p>
+        </p:txBody>
+      </p:sp>
+      <p:sp>
+        <p:nvSpPr>
+          <p:cNvPr id="3" name="Content Placeholder 2">
+            <a:extLst>
+              <a:ext uri="{FF2B5EF4-FFF2-40B4-BE49-F238E27FC236}">
+                <a16:creationId xmlns:a16="http://schemas.microsoft.com/office/drawing/2014/main" id="{8F8C1781-810F-4A25-9748-A8F61B7BBBD5}"/>
+              </a:ext>
+            </a:extLst>
+          </p:cNvPr>
+          <p:cNvSpPr>
+            <a:spLocks noGrp="1"/>
+          </p:cNvSpPr>
+          <p:nvPr>
+            <p:ph sz="half" idx="1"/>
+          </p:nvPr>
+        </p:nvSpPr>
+        <p:spPr/>
+        <p:txBody>
+          <a:bodyPr/>
+          <a:lstStyle/>
+          <a:p>
+            <a:r>
+              <a:rPr lang="en-US" dirty="0"/>
+              <a:t>Flowchart to find Even number between 1 to 50</a:t>
+            </a:r>
+          </a:p>
+          <a:p>
+            <a:endParaRPr lang="en-US" dirty="0"/>
+          </a:p>
+          <a:p>
+            <a:endParaRPr lang="en-SG" dirty="0"/>
+          </a:p>
+        </p:txBody>
+      </p:sp>
+      <p:pic>
+        <p:nvPicPr>
+          <p:cNvPr id="7" name="Content Placeholder 6">
+            <a:extLst>
+              <a:ext uri="{FF2B5EF4-FFF2-40B4-BE49-F238E27FC236}">
+                <a16:creationId xmlns:a16="http://schemas.microsoft.com/office/drawing/2014/main" id="{F21A21FE-4452-4D0F-82C8-37A343FE89A4}"/>
+              </a:ext>
+            </a:extLst>
+          </p:cNvPr>
+          <p:cNvPicPr>
+            <a:picLocks noGrp="1" noChangeAspect="1"/>
+          </p:cNvPicPr>
+          <p:nvPr>
+            <p:ph sz="half" idx="2"/>
+          </p:nvPr>
+        </p:nvPicPr>
+        <p:blipFill>
+          <a:blip r:embed="rId2">
+            <a:extLst>
+              <a:ext uri="{28A0092B-C50C-407E-A947-70E740481C1C}">
+                <a14:useLocalDpi xmlns:a14="http://schemas.microsoft.com/office/drawing/2010/main" val="0"/>
+              </a:ext>
+            </a:extLst>
+          </a:blip>
+          <a:stretch>
+            <a:fillRect/>
+          </a:stretch>
+        </p:blipFill>
+        <p:spPr>
+          <a:xfrm>
+            <a:off x="6846883" y="445770"/>
+            <a:ext cx="4754880" cy="5966460"/>
+          </a:xfrm>
+          <a:solidFill>
+            <a:schemeClr val="tx1"/>
+          </a:solidFill>
+        </p:spPr>
+      </p:pic>
+    </p:spTree>
+    <p:extLst>
+      <p:ext uri="{BB962C8B-B14F-4D97-AF65-F5344CB8AC3E}">
+        <p14:creationId xmlns:p14="http://schemas.microsoft.com/office/powerpoint/2010/main" val="1697501696"/>
+      </p:ext>
+    </p:extLst>
+  </p:cSld>
+  <p:clrMapOvr>
+    <a:masterClrMapping/>
+  </p:clrMapOvr>
+</p:sld>
+</file>
+
+<file path=ppt/slides/slide14.xml><?xml version="1.0" encoding="utf-8"?>
+<p:sld xmlns:a="http://schemas.openxmlformats.org/drawingml/2006/main" xmlns:r="http://schemas.openxmlformats.org/officeDocument/2006/relationships" xmlns:p="http://schemas.openxmlformats.org/presentationml/2006/main">
+  <p:cSld>
+    <p:spTree>
+      <p:nvGrpSpPr>
+        <p:cNvPr id="1" name=""/>
+        <p:cNvGrpSpPr/>
+        <p:nvPr/>
+      </p:nvGrpSpPr>
+      <p:grpSpPr>
+        <a:xfrm>
+          <a:off x="0" y="0"/>
+          <a:ext cx="0" cy="0"/>
+          <a:chOff x="0" y="0"/>
+          <a:chExt cx="0" cy="0"/>
+        </a:xfrm>
+      </p:grpSpPr>
+      <p:sp>
+        <p:nvSpPr>
+          <p:cNvPr id="2" name="Title 1">
+            <a:extLst>
+              <a:ext uri="{FF2B5EF4-FFF2-40B4-BE49-F238E27FC236}">
+                <a16:creationId xmlns:a16="http://schemas.microsoft.com/office/drawing/2014/main" id="{852EC85B-4C5A-452F-BFA9-01CCA4D36D5A}"/>
+              </a:ext>
+            </a:extLst>
+          </p:cNvPr>
+          <p:cNvSpPr>
+            <a:spLocks noGrp="1"/>
+          </p:cNvSpPr>
+          <p:nvPr>
+            <p:ph type="title"/>
+          </p:nvPr>
+        </p:nvSpPr>
+        <p:spPr/>
+        <p:txBody>
+          <a:bodyPr/>
+          <a:lstStyle/>
+          <a:p>
+            <a:r>
+              <a:rPr lang="en-SG" dirty="0"/>
+              <a:t>Exercise 1</a:t>
+            </a:r>
+          </a:p>
+        </p:txBody>
+      </p:sp>
+      <mc:AlternateContent xmlns:mc="http://schemas.openxmlformats.org/markup-compatibility/2006">
+        <mc:Choice xmlns:a14="http://schemas.microsoft.com/office/drawing/2010/main" Requires="a14">
           <p:sp>
             <p:nvSpPr>
               <p:cNvPr id="3" name="Content Placeholder 2">
                 <a:extLst>
                   <a:ext uri="{FF2B5EF4-FFF2-40B4-BE49-F238E27FC236}">
-                    <a16:creationId xmlns:a16="http://schemas.microsoft.com/office/drawing/2014/main" xmlns="" id="{71FB0D52-1AFA-493D-BCCD-5563D69A7671}"/>
+                    <a16:creationId xmlns:a16="http://schemas.microsoft.com/office/drawing/2014/main" id="{71FB0D52-1AFA-493D-BCCD-5563D69A7671}"/>
                   </a:ext>
                 </a:extLst>
               </p:cNvPr>
@@ -5899,11 +6396,387 @@
               <a:p>
                 <a:r>
                   <a:rPr lang="en-SG" dirty="0"/>
-                  <a:t>Write the </a:t>
+                  <a:t>Draw the flowchart</a:t>
                 </a:r>
                 <a:r>
                   <a:rPr lang="en-US" dirty="0"/>
-                  <a:t>Algorithm to find sum of series </a:t>
+                  <a:t> to convert temperature from Celsius to Fahrenheit</a:t>
+                </a:r>
+              </a:p>
+              <a:p>
+                <a:r>
+                  <a:rPr lang="en-US" dirty="0"/>
+                  <a:t>Hint: </a:t>
+                </a:r>
+                <a14:m>
+                  <m:oMath xmlns:m="http://schemas.openxmlformats.org/officeDocument/2006/math">
+                    <m:r>
+                      <m:rPr>
+                        <m:sty m:val="p"/>
+                      </m:rPr>
+                      <a:rPr lang="en-SG" b="0" i="0" smtClean="0">
+                        <a:latin typeface="Cambria Math" panose="02040503050406030204" pitchFamily="18" charset="0"/>
+                      </a:rPr>
+                      <m:t>F</m:t>
+                    </m:r>
+                    <m:r>
+                      <a:rPr lang="en-SG" b="0" i="0" smtClean="0">
+                        <a:latin typeface="Cambria Math" panose="02040503050406030204" pitchFamily="18" charset="0"/>
+                      </a:rPr>
+                      <m:t>=</m:t>
+                    </m:r>
+                    <m:f>
+                      <m:fPr>
+                        <m:ctrlPr>
+                          <a:rPr lang="en-US" i="1" smtClean="0">
+                            <a:latin typeface="Cambria Math" panose="02040503050406030204" pitchFamily="18" charset="0"/>
+                          </a:rPr>
+                        </m:ctrlPr>
+                      </m:fPr>
+                      <m:num>
+                        <m:r>
+                          <a:rPr lang="en-SG" b="0" i="1" smtClean="0">
+                            <a:latin typeface="Cambria Math" panose="02040503050406030204" pitchFamily="18" charset="0"/>
+                          </a:rPr>
+                          <m:t>9</m:t>
+                        </m:r>
+                      </m:num>
+                      <m:den>
+                        <m:r>
+                          <a:rPr lang="en-SG" b="0" i="1" smtClean="0">
+                            <a:latin typeface="Cambria Math" panose="02040503050406030204" pitchFamily="18" charset="0"/>
+                          </a:rPr>
+                          <m:t>5</m:t>
+                        </m:r>
+                      </m:den>
+                    </m:f>
+                    <m:r>
+                      <a:rPr lang="en-SG" b="0" i="1" smtClean="0">
+                        <a:latin typeface="Cambria Math" panose="02040503050406030204" pitchFamily="18" charset="0"/>
+                      </a:rPr>
+                      <m:t>𝐶</m:t>
+                    </m:r>
+                    <m:r>
+                      <a:rPr lang="en-SG" b="0" i="1" smtClean="0">
+                        <a:latin typeface="Cambria Math" panose="02040503050406030204" pitchFamily="18" charset="0"/>
+                      </a:rPr>
+                      <m:t>+32</m:t>
+                    </m:r>
+                  </m:oMath>
+                </a14:m>
+                <a:endParaRPr lang="en-SG" dirty="0"/>
+              </a:p>
+            </p:txBody>
+          </p:sp>
+        </mc:Choice>
+        <mc:Fallback>
+          <p:sp>
+            <p:nvSpPr>
+              <p:cNvPr id="3" name="Content Placeholder 2">
+                <a:extLst>
+                  <a:ext uri="{FF2B5EF4-FFF2-40B4-BE49-F238E27FC236}">
+                    <a16:creationId xmlns:a16="http://schemas.microsoft.com/office/drawing/2014/main" id="{71FB0D52-1AFA-493D-BCCD-5563D69A7671}"/>
+                  </a:ext>
+                </a:extLst>
+              </p:cNvPr>
+              <p:cNvSpPr>
+                <a:spLocks noGrp="1" noRot="1" noChangeAspect="1" noMove="1" noResize="1" noEditPoints="1" noAdjustHandles="1" noChangeArrowheads="1" noChangeShapeType="1" noTextEdit="1"/>
+              </p:cNvSpPr>
+              <p:nvPr>
+                <p:ph idx="1"/>
+              </p:nvPr>
+            </p:nvSpPr>
+            <p:spPr>
+              <a:blipFill>
+                <a:blip r:embed="rId2"/>
+                <a:stretch>
+                  <a:fillRect l="-1046"/>
+                </a:stretch>
+              </a:blipFill>
+            </p:spPr>
+            <p:txBody>
+              <a:bodyPr/>
+              <a:lstStyle/>
+              <a:p>
+                <a:r>
+                  <a:rPr lang="en-SG">
+                    <a:noFill/>
+                  </a:rPr>
+                  <a:t> </a:t>
+                </a:r>
+              </a:p>
+            </p:txBody>
+          </p:sp>
+        </mc:Fallback>
+      </mc:AlternateContent>
+    </p:spTree>
+    <p:extLst>
+      <p:ext uri="{BB962C8B-B14F-4D97-AF65-F5344CB8AC3E}">
+        <p14:creationId xmlns:p14="http://schemas.microsoft.com/office/powerpoint/2010/main" val="2975984063"/>
+      </p:ext>
+    </p:extLst>
+  </p:cSld>
+  <p:clrMapOvr>
+    <a:masterClrMapping/>
+  </p:clrMapOvr>
+</p:sld>
+</file>
+
+<file path=ppt/slides/slide15.xml><?xml version="1.0" encoding="utf-8"?>
+<p:sld xmlns:a="http://schemas.openxmlformats.org/drawingml/2006/main" xmlns:r="http://schemas.openxmlformats.org/officeDocument/2006/relationships" xmlns:p="http://schemas.openxmlformats.org/presentationml/2006/main">
+  <p:cSld>
+    <p:spTree>
+      <p:nvGrpSpPr>
+        <p:cNvPr id="1" name=""/>
+        <p:cNvGrpSpPr/>
+        <p:nvPr/>
+      </p:nvGrpSpPr>
+      <p:grpSpPr>
+        <a:xfrm>
+          <a:off x="0" y="0"/>
+          <a:ext cx="0" cy="0"/>
+          <a:chOff x="0" y="0"/>
+          <a:chExt cx="0" cy="0"/>
+        </a:xfrm>
+      </p:grpSpPr>
+      <p:sp>
+        <p:nvSpPr>
+          <p:cNvPr id="2" name="Title 1">
+            <a:extLst>
+              <a:ext uri="{FF2B5EF4-FFF2-40B4-BE49-F238E27FC236}">
+                <a16:creationId xmlns:a16="http://schemas.microsoft.com/office/drawing/2014/main" id="{852EC85B-4C5A-452F-BFA9-01CCA4D36D5A}"/>
+              </a:ext>
+            </a:extLst>
+          </p:cNvPr>
+          <p:cNvSpPr>
+            <a:spLocks noGrp="1"/>
+          </p:cNvSpPr>
+          <p:nvPr>
+            <p:ph type="title"/>
+          </p:nvPr>
+        </p:nvSpPr>
+        <p:spPr/>
+        <p:txBody>
+          <a:bodyPr/>
+          <a:lstStyle/>
+          <a:p>
+            <a:r>
+              <a:rPr lang="en-SG" dirty="0"/>
+              <a:t>Exercise 2</a:t>
+            </a:r>
+          </a:p>
+        </p:txBody>
+      </p:sp>
+      <p:sp>
+        <p:nvSpPr>
+          <p:cNvPr id="3" name="Content Placeholder 2">
+            <a:extLst>
+              <a:ext uri="{FF2B5EF4-FFF2-40B4-BE49-F238E27FC236}">
+                <a16:creationId xmlns:a16="http://schemas.microsoft.com/office/drawing/2014/main" id="{71FB0D52-1AFA-493D-BCCD-5563D69A7671}"/>
+              </a:ext>
+            </a:extLst>
+          </p:cNvPr>
+          <p:cNvSpPr>
+            <a:spLocks noGrp="1"/>
+          </p:cNvSpPr>
+          <p:nvPr>
+            <p:ph idx="1"/>
+          </p:nvPr>
+        </p:nvSpPr>
+        <p:spPr/>
+        <p:txBody>
+          <a:bodyPr/>
+          <a:lstStyle/>
+          <a:p>
+            <a:r>
+              <a:rPr lang="en-SG" dirty="0"/>
+              <a:t>Draw the flowchart</a:t>
+            </a:r>
+            <a:r>
+              <a:rPr lang="en-US" dirty="0"/>
+              <a:t> to find the largest of two numbers</a:t>
+            </a:r>
+          </a:p>
+        </p:txBody>
+      </p:sp>
+    </p:spTree>
+    <p:extLst>
+      <p:ext uri="{BB962C8B-B14F-4D97-AF65-F5344CB8AC3E}">
+        <p14:creationId xmlns:p14="http://schemas.microsoft.com/office/powerpoint/2010/main" val="320625042"/>
+      </p:ext>
+    </p:extLst>
+  </p:cSld>
+  <p:clrMapOvr>
+    <a:masterClrMapping/>
+  </p:clrMapOvr>
+</p:sld>
+</file>
+
+<file path=ppt/slides/slide16.xml><?xml version="1.0" encoding="utf-8"?>
+<p:sld xmlns:a="http://schemas.openxmlformats.org/drawingml/2006/main" xmlns:r="http://schemas.openxmlformats.org/officeDocument/2006/relationships" xmlns:p="http://schemas.openxmlformats.org/presentationml/2006/main">
+  <p:cSld>
+    <p:spTree>
+      <p:nvGrpSpPr>
+        <p:cNvPr id="1" name=""/>
+        <p:cNvGrpSpPr/>
+        <p:nvPr/>
+      </p:nvGrpSpPr>
+      <p:grpSpPr>
+        <a:xfrm>
+          <a:off x="0" y="0"/>
+          <a:ext cx="0" cy="0"/>
+          <a:chOff x="0" y="0"/>
+          <a:chExt cx="0" cy="0"/>
+        </a:xfrm>
+      </p:grpSpPr>
+      <p:sp>
+        <p:nvSpPr>
+          <p:cNvPr id="2" name="Title 1">
+            <a:extLst>
+              <a:ext uri="{FF2B5EF4-FFF2-40B4-BE49-F238E27FC236}">
+                <a16:creationId xmlns:a16="http://schemas.microsoft.com/office/drawing/2014/main" id="{852EC85B-4C5A-452F-BFA9-01CCA4D36D5A}"/>
+              </a:ext>
+            </a:extLst>
+          </p:cNvPr>
+          <p:cNvSpPr>
+            <a:spLocks noGrp="1"/>
+          </p:cNvSpPr>
+          <p:nvPr>
+            <p:ph type="title"/>
+          </p:nvPr>
+        </p:nvSpPr>
+        <p:spPr/>
+        <p:txBody>
+          <a:bodyPr/>
+          <a:lstStyle/>
+          <a:p>
+            <a:r>
+              <a:rPr lang="en-SG" dirty="0"/>
+              <a:t>Exercise 3</a:t>
+            </a:r>
+          </a:p>
+        </p:txBody>
+      </p:sp>
+      <p:sp>
+        <p:nvSpPr>
+          <p:cNvPr id="3" name="Content Placeholder 2">
+            <a:extLst>
+              <a:ext uri="{FF2B5EF4-FFF2-40B4-BE49-F238E27FC236}">
+                <a16:creationId xmlns:a16="http://schemas.microsoft.com/office/drawing/2014/main" id="{71FB0D52-1AFA-493D-BCCD-5563D69A7671}"/>
+              </a:ext>
+            </a:extLst>
+          </p:cNvPr>
+          <p:cNvSpPr>
+            <a:spLocks noGrp="1"/>
+          </p:cNvSpPr>
+          <p:nvPr>
+            <p:ph idx="1"/>
+          </p:nvPr>
+        </p:nvSpPr>
+        <p:spPr/>
+        <p:txBody>
+          <a:bodyPr/>
+          <a:lstStyle/>
+          <a:p>
+            <a:r>
+              <a:rPr lang="en-SG" dirty="0"/>
+              <a:t>Draw the flowchart</a:t>
+            </a:r>
+            <a:r>
+              <a:rPr lang="en-US" dirty="0"/>
+              <a:t> to find the largest of three numbers</a:t>
+            </a:r>
+          </a:p>
+        </p:txBody>
+      </p:sp>
+    </p:spTree>
+    <p:extLst>
+      <p:ext uri="{BB962C8B-B14F-4D97-AF65-F5344CB8AC3E}">
+        <p14:creationId xmlns:p14="http://schemas.microsoft.com/office/powerpoint/2010/main" val="3667304729"/>
+      </p:ext>
+    </p:extLst>
+  </p:cSld>
+  <p:clrMapOvr>
+    <a:masterClrMapping/>
+  </p:clrMapOvr>
+</p:sld>
+</file>
+
+<file path=ppt/slides/slide17.xml><?xml version="1.0" encoding="utf-8"?>
+<p:sld xmlns:a="http://schemas.openxmlformats.org/drawingml/2006/main" xmlns:r="http://schemas.openxmlformats.org/officeDocument/2006/relationships" xmlns:p="http://schemas.openxmlformats.org/presentationml/2006/main">
+  <p:cSld>
+    <p:spTree>
+      <p:nvGrpSpPr>
+        <p:cNvPr id="1" name=""/>
+        <p:cNvGrpSpPr/>
+        <p:nvPr/>
+      </p:nvGrpSpPr>
+      <p:grpSpPr>
+        <a:xfrm>
+          <a:off x="0" y="0"/>
+          <a:ext cx="0" cy="0"/>
+          <a:chOff x="0" y="0"/>
+          <a:chExt cx="0" cy="0"/>
+        </a:xfrm>
+      </p:grpSpPr>
+      <p:sp>
+        <p:nvSpPr>
+          <p:cNvPr id="2" name="Title 1">
+            <a:extLst>
+              <a:ext uri="{FF2B5EF4-FFF2-40B4-BE49-F238E27FC236}">
+                <a16:creationId xmlns:a16="http://schemas.microsoft.com/office/drawing/2014/main" id="{852EC85B-4C5A-452F-BFA9-01CCA4D36D5A}"/>
+              </a:ext>
+            </a:extLst>
+          </p:cNvPr>
+          <p:cNvSpPr>
+            <a:spLocks noGrp="1"/>
+          </p:cNvSpPr>
+          <p:nvPr>
+            <p:ph type="title"/>
+          </p:nvPr>
+        </p:nvSpPr>
+        <p:spPr/>
+        <p:txBody>
+          <a:bodyPr/>
+          <a:lstStyle/>
+          <a:p>
+            <a:r>
+              <a:rPr lang="en-SG" dirty="0"/>
+              <a:t>Exercise 4</a:t>
+            </a:r>
+          </a:p>
+        </p:txBody>
+      </p:sp>
+      <mc:AlternateContent xmlns:mc="http://schemas.openxmlformats.org/markup-compatibility/2006">
+        <mc:Choice xmlns:a14="http://schemas.microsoft.com/office/drawing/2010/main" Requires="a14">
+          <p:sp>
+            <p:nvSpPr>
+              <p:cNvPr id="3" name="Content Placeholder 2">
+                <a:extLst>
+                  <a:ext uri="{FF2B5EF4-FFF2-40B4-BE49-F238E27FC236}">
+                    <a16:creationId xmlns:a16="http://schemas.microsoft.com/office/drawing/2014/main" id="{71FB0D52-1AFA-493D-BCCD-5563D69A7671}"/>
+                  </a:ext>
+                </a:extLst>
+              </p:cNvPr>
+              <p:cNvSpPr>
+                <a:spLocks noGrp="1"/>
+              </p:cNvSpPr>
+              <p:nvPr>
+                <p:ph idx="1"/>
+              </p:nvPr>
+            </p:nvSpPr>
+            <p:spPr/>
+            <p:txBody>
+              <a:bodyPr/>
+              <a:lstStyle/>
+              <a:p>
+                <a:r>
+                  <a:rPr lang="en-SG" dirty="0"/>
+                  <a:t>Draw the flowchart</a:t>
+                </a:r>
+                <a:r>
+                  <a:rPr lang="en-US" dirty="0"/>
+                  <a:t> to find sum of series </a:t>
                 </a:r>
                 <a14:m>
                   <m:oMath xmlns:m="http://schemas.openxmlformats.org/officeDocument/2006/math">
@@ -5926,7 +6799,7 @@
             </p:txBody>
           </p:sp>
         </mc:Choice>
-        <mc:Fallback xmlns="">
+        <mc:Fallback>
           <p:sp>
             <p:nvSpPr>
               <p:cNvPr id="3" name="Content Placeholder 2">
@@ -5979,7 +6852,7 @@
 </p:sld>
 </file>
 
-<file path=ppt/slides/slide11.xml><?xml version="1.0" encoding="utf-8"?>
+<file path=ppt/slides/slide18.xml><?xml version="1.0" encoding="utf-8"?>
 <p:sld xmlns:a="http://schemas.openxmlformats.org/drawingml/2006/main" xmlns:r="http://schemas.openxmlformats.org/officeDocument/2006/relationships" xmlns:p="http://schemas.openxmlformats.org/presentationml/2006/main">
   <p:cSld>
     <p:spTree>
@@ -6001,7 +6874,7 @@
           <p:cNvPr id="2" name="Title 1">
             <a:extLst>
               <a:ext uri="{FF2B5EF4-FFF2-40B4-BE49-F238E27FC236}">
-                <a16:creationId xmlns:a16="http://schemas.microsoft.com/office/drawing/2014/main" xmlns="" id="{852EC85B-4C5A-452F-BFA9-01CCA4D36D5A}"/>
+                <a16:creationId xmlns:a16="http://schemas.microsoft.com/office/drawing/2014/main" id="{852EC85B-4C5A-452F-BFA9-01CCA4D36D5A}"/>
               </a:ext>
             </a:extLst>
           </p:cNvPr>
@@ -6024,14 +6897,14 @@
           </a:p>
         </p:txBody>
       </p:sp>
-      <mc:AlternateContent xmlns:mc="http://schemas.openxmlformats.org/markup-compatibility/2006" xmlns:a14="http://schemas.microsoft.com/office/drawing/2010/main">
-        <mc:Choice Requires="a14">
+      <mc:AlternateContent xmlns:mc="http://schemas.openxmlformats.org/markup-compatibility/2006">
+        <mc:Choice xmlns:a14="http://schemas.microsoft.com/office/drawing/2010/main" Requires="a14">
           <p:sp>
             <p:nvSpPr>
               <p:cNvPr id="3" name="Content Placeholder 2">
                 <a:extLst>
                   <a:ext uri="{FF2B5EF4-FFF2-40B4-BE49-F238E27FC236}">
-                    <a16:creationId xmlns:a16="http://schemas.microsoft.com/office/drawing/2014/main" xmlns="" id="{71FB0D52-1AFA-493D-BCCD-5563D69A7671}"/>
+                    <a16:creationId xmlns:a16="http://schemas.microsoft.com/office/drawing/2014/main" id="{71FB0D52-1AFA-493D-BCCD-5563D69A7671}"/>
                   </a:ext>
                 </a:extLst>
               </p:cNvPr>
@@ -6049,11 +6922,11 @@
               <a:p>
                 <a:r>
                   <a:rPr lang="en-SG" dirty="0"/>
-                  <a:t>Write the </a:t>
+                  <a:t>Draw the flowchart</a:t>
                 </a:r>
                 <a:r>
                   <a:rPr lang="en-US" dirty="0"/>
-                  <a:t>Algorithm to find sum of series </a:t>
+                  <a:t> to find sum of series </a:t>
                 </a:r>
                 <a14:m>
                   <m:oMath xmlns:m="http://schemas.openxmlformats.org/officeDocument/2006/math">
@@ -6093,7 +6966,7 @@
             </p:txBody>
           </p:sp>
         </mc:Choice>
-        <mc:Fallback xmlns="">
+        <mc:Fallback>
           <p:sp>
             <p:nvSpPr>
               <p:cNvPr id="3" name="Content Placeholder 2">
@@ -6146,7 +7019,7 @@
 </p:sld>
 </file>
 
-<file path=ppt/slides/slide12.xml><?xml version="1.0" encoding="utf-8"?>
+<file path=ppt/slides/slide19.xml><?xml version="1.0" encoding="utf-8"?>
 <p:sld xmlns:a="http://schemas.openxmlformats.org/drawingml/2006/main" xmlns:r="http://schemas.openxmlformats.org/officeDocument/2006/relationships" xmlns:p="http://schemas.openxmlformats.org/presentationml/2006/main">
   <p:cSld>
     <p:spTree>
@@ -6168,7 +7041,7 @@
           <p:cNvPr id="2" name="Title 1">
             <a:extLst>
               <a:ext uri="{FF2B5EF4-FFF2-40B4-BE49-F238E27FC236}">
-                <a16:creationId xmlns:a16="http://schemas.microsoft.com/office/drawing/2014/main" xmlns="" id="{852EC85B-4C5A-452F-BFA9-01CCA4D36D5A}"/>
+                <a16:creationId xmlns:a16="http://schemas.microsoft.com/office/drawing/2014/main" id="{852EC85B-4C5A-452F-BFA9-01CCA4D36D5A}"/>
               </a:ext>
             </a:extLst>
           </p:cNvPr>
@@ -6191,14 +7064,14 @@
           </a:p>
         </p:txBody>
       </p:sp>
-      <mc:AlternateContent xmlns:mc="http://schemas.openxmlformats.org/markup-compatibility/2006" xmlns:a14="http://schemas.microsoft.com/office/drawing/2010/main">
-        <mc:Choice Requires="a14">
+      <mc:AlternateContent xmlns:mc="http://schemas.openxmlformats.org/markup-compatibility/2006">
+        <mc:Choice xmlns:a14="http://schemas.microsoft.com/office/drawing/2010/main" Requires="a14">
           <p:sp>
             <p:nvSpPr>
               <p:cNvPr id="3" name="Content Placeholder 2">
                 <a:extLst>
                   <a:ext uri="{FF2B5EF4-FFF2-40B4-BE49-F238E27FC236}">
-                    <a16:creationId xmlns:a16="http://schemas.microsoft.com/office/drawing/2014/main" xmlns="" id="{71FB0D52-1AFA-493D-BCCD-5563D69A7671}"/>
+                    <a16:creationId xmlns:a16="http://schemas.microsoft.com/office/drawing/2014/main" id="{71FB0D52-1AFA-493D-BCCD-5563D69A7671}"/>
                   </a:ext>
                 </a:extLst>
               </p:cNvPr>
@@ -6216,11 +7089,11 @@
               <a:p>
                 <a:r>
                   <a:rPr lang="en-SG" dirty="0"/>
-                  <a:t>Write the </a:t>
+                  <a:t>Draw the flowchart</a:t>
                 </a:r>
                 <a:r>
                   <a:rPr lang="en-US" dirty="0"/>
-                  <a:t>Algorithm to find sum of series </a:t>
+                  <a:t> to find sum of series </a:t>
                 </a:r>
                 <a14:m>
                   <m:oMath xmlns:m="http://schemas.openxmlformats.org/officeDocument/2006/math">
@@ -6355,7 +7228,7 @@
             </p:txBody>
           </p:sp>
         </mc:Choice>
-        <mc:Fallback xmlns="">
+        <mc:Fallback>
           <p:sp>
             <p:nvSpPr>
               <p:cNvPr id="3" name="Content Placeholder 2">
@@ -6408,70 +7281,6 @@
 </p:sld>
 </file>
 
-<file path=ppt/slides/slide13.xml><?xml version="1.0" encoding="utf-8"?>
-<p:sld xmlns:a="http://schemas.openxmlformats.org/drawingml/2006/main" xmlns:r="http://schemas.openxmlformats.org/officeDocument/2006/relationships" xmlns:p="http://schemas.openxmlformats.org/presentationml/2006/main">
-  <p:cSld>
-    <p:spTree>
-      <p:nvGrpSpPr>
-        <p:cNvPr id="1" name=""/>
-        <p:cNvGrpSpPr/>
-        <p:nvPr/>
-      </p:nvGrpSpPr>
-      <p:grpSpPr>
-        <a:xfrm>
-          <a:off x="0" y="0"/>
-          <a:ext cx="0" cy="0"/>
-          <a:chOff x="0" y="0"/>
-          <a:chExt cx="0" cy="0"/>
-        </a:xfrm>
-      </p:grpSpPr>
-      <p:sp>
-        <p:nvSpPr>
-          <p:cNvPr id="5" name="Title 4">
-            <a:extLst>
-              <a:ext uri="{FF2B5EF4-FFF2-40B4-BE49-F238E27FC236}">
-                <a16:creationId xmlns:a16="http://schemas.microsoft.com/office/drawing/2014/main" xmlns="" id="{1591033B-A0A2-4910-90D5-E73A78A442B0}"/>
-              </a:ext>
-            </a:extLst>
-          </p:cNvPr>
-          <p:cNvSpPr>
-            <a:spLocks noGrp="1"/>
-          </p:cNvSpPr>
-          <p:nvPr>
-            <p:ph type="title"/>
-          </p:nvPr>
-        </p:nvSpPr>
-        <p:spPr>
-          <a:xfrm>
-            <a:off x="1640156" y="3121223"/>
-            <a:ext cx="8911687" cy="615553"/>
-          </a:xfrm>
-        </p:spPr>
-        <p:txBody>
-          <a:bodyPr anchor="ctr"/>
-          <a:lstStyle/>
-          <a:p>
-            <a:pPr algn="ctr"/>
-            <a:r>
-              <a:rPr lang="en-SG" dirty="0"/>
-              <a:t>The end</a:t>
-            </a:r>
-          </a:p>
-        </p:txBody>
-      </p:sp>
-    </p:spTree>
-    <p:extLst>
-      <p:ext uri="{BB962C8B-B14F-4D97-AF65-F5344CB8AC3E}">
-        <p14:creationId xmlns:p14="http://schemas.microsoft.com/office/powerpoint/2010/main" val="3507043227"/>
-      </p:ext>
-    </p:extLst>
-  </p:cSld>
-  <p:clrMapOvr>
-    <a:masterClrMapping/>
-  </p:clrMapOvr>
-</p:sld>
-</file>
-
 <file path=ppt/slides/slide2.xml><?xml version="1.0" encoding="utf-8"?>
 <p:sld xmlns:a="http://schemas.openxmlformats.org/drawingml/2006/main" xmlns:r="http://schemas.openxmlformats.org/officeDocument/2006/relationships" xmlns:p="http://schemas.openxmlformats.org/presentationml/2006/main">
   <p:cSld>
@@ -6494,7 +7303,7 @@
           <p:cNvPr id="2" name="Title 1">
             <a:extLst>
               <a:ext uri="{FF2B5EF4-FFF2-40B4-BE49-F238E27FC236}">
-                <a16:creationId xmlns:a16="http://schemas.microsoft.com/office/drawing/2014/main" xmlns="" id="{8DBD61DA-85D0-4639-AFCE-F80F48521BF1}"/>
+                <a16:creationId xmlns:a16="http://schemas.microsoft.com/office/drawing/2014/main" id="{8DBD61DA-85D0-4639-AFCE-F80F48521BF1}"/>
               </a:ext>
             </a:extLst>
           </p:cNvPr>
@@ -6522,7 +7331,7 @@
           <p:cNvPr id="3" name="Content Placeholder 2">
             <a:extLst>
               <a:ext uri="{FF2B5EF4-FFF2-40B4-BE49-F238E27FC236}">
-                <a16:creationId xmlns:a16="http://schemas.microsoft.com/office/drawing/2014/main" xmlns="" id="{42D4F774-BAD3-45DD-BF52-03C72E771D92}"/>
+                <a16:creationId xmlns:a16="http://schemas.microsoft.com/office/drawing/2014/main" id="{42D4F774-BAD3-45DD-BF52-03C72E771D92}"/>
               </a:ext>
             </a:extLst>
           </p:cNvPr>
@@ -6539,28 +7348,26 @@
           <a:lstStyle/>
           <a:p>
             <a:r>
-              <a:rPr lang="en-SG" b="1" dirty="0" smtClean="0"/>
+              <a:rPr lang="en-SG" b="1" dirty="0"/>
               <a:t>Definition</a:t>
             </a:r>
-            <a:endParaRPr lang="en-SG" b="1" dirty="0"/>
-          </a:p>
-          <a:p>
-            <a:r>
-              <a:rPr lang="en-SG" dirty="0" smtClean="0"/>
+          </a:p>
+          <a:p>
+            <a:r>
+              <a:rPr lang="en-SG" dirty="0"/>
               <a:t>Symbols</a:t>
             </a:r>
           </a:p>
           <a:p>
             <a:r>
-              <a:rPr lang="en-SG" dirty="0" smtClean="0"/>
+              <a:rPr lang="en-SG" dirty="0"/>
               <a:t>Flowchart constructs</a:t>
             </a:r>
-            <a:endParaRPr lang="en-SG" dirty="0"/>
           </a:p>
           <a:p>
             <a:r>
               <a:rPr lang="en-SG" dirty="0"/>
-              <a:t>Exercises</a:t>
+              <a:t>Examples and Exercises</a:t>
             </a:r>
           </a:p>
         </p:txBody>
@@ -6569,6 +7376,70 @@
     <p:extLst>
       <p:ext uri="{BB962C8B-B14F-4D97-AF65-F5344CB8AC3E}">
         <p14:creationId xmlns:p14="http://schemas.microsoft.com/office/powerpoint/2010/main" val="2648964844"/>
+      </p:ext>
+    </p:extLst>
+  </p:cSld>
+  <p:clrMapOvr>
+    <a:masterClrMapping/>
+  </p:clrMapOvr>
+</p:sld>
+</file>
+
+<file path=ppt/slides/slide20.xml><?xml version="1.0" encoding="utf-8"?>
+<p:sld xmlns:a="http://schemas.openxmlformats.org/drawingml/2006/main" xmlns:r="http://schemas.openxmlformats.org/officeDocument/2006/relationships" xmlns:p="http://schemas.openxmlformats.org/presentationml/2006/main">
+  <p:cSld>
+    <p:spTree>
+      <p:nvGrpSpPr>
+        <p:cNvPr id="1" name=""/>
+        <p:cNvGrpSpPr/>
+        <p:nvPr/>
+      </p:nvGrpSpPr>
+      <p:grpSpPr>
+        <a:xfrm>
+          <a:off x="0" y="0"/>
+          <a:ext cx="0" cy="0"/>
+          <a:chOff x="0" y="0"/>
+          <a:chExt cx="0" cy="0"/>
+        </a:xfrm>
+      </p:grpSpPr>
+      <p:sp>
+        <p:nvSpPr>
+          <p:cNvPr id="5" name="Title 4">
+            <a:extLst>
+              <a:ext uri="{FF2B5EF4-FFF2-40B4-BE49-F238E27FC236}">
+                <a16:creationId xmlns:a16="http://schemas.microsoft.com/office/drawing/2014/main" id="{1591033B-A0A2-4910-90D5-E73A78A442B0}"/>
+              </a:ext>
+            </a:extLst>
+          </p:cNvPr>
+          <p:cNvSpPr>
+            <a:spLocks noGrp="1"/>
+          </p:cNvSpPr>
+          <p:nvPr>
+            <p:ph type="title"/>
+          </p:nvPr>
+        </p:nvSpPr>
+        <p:spPr>
+          <a:xfrm>
+            <a:off x="1640156" y="3121223"/>
+            <a:ext cx="8911687" cy="615553"/>
+          </a:xfrm>
+        </p:spPr>
+        <p:txBody>
+          <a:bodyPr anchor="ctr"/>
+          <a:lstStyle/>
+          <a:p>
+            <a:pPr algn="ctr"/>
+            <a:r>
+              <a:rPr lang="en-SG" dirty="0"/>
+              <a:t>The end</a:t>
+            </a:r>
+          </a:p>
+        </p:txBody>
+      </p:sp>
+    </p:spTree>
+    <p:extLst>
+      <p:ext uri="{BB962C8B-B14F-4D97-AF65-F5344CB8AC3E}">
+        <p14:creationId xmlns:p14="http://schemas.microsoft.com/office/powerpoint/2010/main" val="3507043227"/>
       </p:ext>
     </p:extLst>
   </p:cSld>
@@ -6600,7 +7471,7 @@
           <p:cNvPr id="2" name="Title 1">
             <a:extLst>
               <a:ext uri="{FF2B5EF4-FFF2-40B4-BE49-F238E27FC236}">
-                <a16:creationId xmlns:a16="http://schemas.microsoft.com/office/drawing/2014/main" xmlns="" id="{3324BC25-C1BC-49F8-BDB5-D8E12BD0DDE7}"/>
+                <a16:creationId xmlns:a16="http://schemas.microsoft.com/office/drawing/2014/main" id="{3324BC25-C1BC-49F8-BDB5-D8E12BD0DDE7}"/>
               </a:ext>
             </a:extLst>
           </p:cNvPr>
@@ -6628,7 +7499,7 @@
           <p:cNvPr id="3" name="Content Placeholder 2">
             <a:extLst>
               <a:ext uri="{FF2B5EF4-FFF2-40B4-BE49-F238E27FC236}">
-                <a16:creationId xmlns:a16="http://schemas.microsoft.com/office/drawing/2014/main" xmlns="" id="{4CBC2B4C-06A6-4814-BB11-EA88531B14A1}"/>
+                <a16:creationId xmlns:a16="http://schemas.microsoft.com/office/drawing/2014/main" id="{4CBC2B4C-06A6-4814-BB11-EA88531B14A1}"/>
               </a:ext>
             </a:extLst>
           </p:cNvPr>
@@ -6656,7 +7527,7 @@
           <p:cNvPr id="4" name="TextBox 3">
             <a:extLst>
               <a:ext uri="{FF2B5EF4-FFF2-40B4-BE49-F238E27FC236}">
-                <a16:creationId xmlns:a16="http://schemas.microsoft.com/office/drawing/2014/main" xmlns="" id="{58D340F3-6201-40DE-8D71-4D1BD63EBA06}"/>
+                <a16:creationId xmlns:a16="http://schemas.microsoft.com/office/drawing/2014/main" id="{58D340F3-6201-40DE-8D71-4D1BD63EBA06}"/>
               </a:ext>
             </a:extLst>
           </p:cNvPr>
@@ -6684,16 +7555,12 @@
               <a:t>In the context of computer programming, an </a:t>
             </a:r>
             <a:r>
-              <a:rPr lang="en-US" i="1" dirty="0" smtClean="0"/>
+              <a:rPr lang="en-US" i="1" dirty="0"/>
               <a:t>flowchart</a:t>
             </a:r>
             <a:r>
-              <a:rPr lang="en-US" dirty="0" smtClean="0"/>
-              <a:t>, </a:t>
-            </a:r>
-            <a:r>
               <a:rPr lang="en-US" dirty="0"/>
-              <a:t>is defined as a:</a:t>
+              <a:t>, is defined as a:</a:t>
             </a:r>
           </a:p>
           <a:p>
@@ -6702,20 +7569,16 @@
           <a:p>
             <a:pPr algn="ctr"/>
             <a:r>
-              <a:rPr lang="en-US" dirty="0" smtClean="0"/>
+              <a:rPr lang="en-US" dirty="0"/>
               <a:t>“</a:t>
             </a:r>
             <a:r>
-              <a:rPr lang="en-US" u="sng" dirty="0" smtClean="0"/>
+              <a:rPr lang="en-US" u="sng" dirty="0"/>
               <a:t>Diagrammatic/Graphical</a:t>
             </a:r>
             <a:r>
-              <a:rPr lang="en-US" dirty="0" smtClean="0"/>
-              <a:t> </a:t>
-            </a:r>
-            <a:r>
               <a:rPr lang="en-US" dirty="0"/>
-              <a:t>representation of </a:t>
+              <a:t> representation of </a:t>
             </a:r>
             <a:r>
               <a:rPr lang="en-US" u="sng" dirty="0"/>
@@ -6730,42 +7593,42 @@
               <a:t>solve a problem</a:t>
             </a:r>
             <a:r>
-              <a:rPr lang="en-US" dirty="0" smtClean="0"/>
+              <a:rPr lang="en-US" dirty="0"/>
               <a:t>.”</a:t>
             </a:r>
           </a:p>
           <a:p>
             <a:pPr algn="ctr"/>
-            <a:endParaRPr lang="en-US" dirty="0" smtClean="0"/>
+            <a:endParaRPr lang="en-US" dirty="0"/>
           </a:p>
           <a:p>
             <a:pPr algn="ctr"/>
             <a:r>
-              <a:rPr lang="en-US" dirty="0" smtClean="0"/>
+              <a:rPr lang="en-US" dirty="0"/>
               <a:t>“Flowchart is a </a:t>
             </a:r>
             <a:r>
-              <a:rPr lang="en-US" u="sng" dirty="0" smtClean="0"/>
+              <a:rPr lang="en-US" u="sng" dirty="0"/>
               <a:t>graphical tool</a:t>
             </a:r>
             <a:r>
-              <a:rPr lang="en-US" dirty="0" smtClean="0"/>
+              <a:rPr lang="en-US" dirty="0"/>
               <a:t> that </a:t>
             </a:r>
             <a:r>
-              <a:rPr lang="en-US" u="sng" dirty="0" smtClean="0"/>
+              <a:rPr lang="en-US" u="sng" dirty="0"/>
               <a:t>diagrammatically</a:t>
             </a:r>
             <a:r>
-              <a:rPr lang="en-US" dirty="0" smtClean="0"/>
+              <a:rPr lang="en-US" dirty="0"/>
               <a:t> depicts the steps and structure of an </a:t>
             </a:r>
             <a:r>
-              <a:rPr lang="en-US" u="sng" dirty="0" smtClean="0"/>
+              <a:rPr lang="en-US" u="sng" dirty="0"/>
               <a:t>algorithm</a:t>
             </a:r>
             <a:r>
-              <a:rPr lang="en-US" dirty="0" smtClean="0"/>
+              <a:rPr lang="en-US" dirty="0"/>
               <a:t> or program”</a:t>
             </a:r>
             <a:endParaRPr lang="en-SG" dirty="0"/>
@@ -6807,7 +7670,7 @@
           <p:cNvPr id="2" name="Title 1">
             <a:extLst>
               <a:ext uri="{FF2B5EF4-FFF2-40B4-BE49-F238E27FC236}">
-                <a16:creationId xmlns:a16="http://schemas.microsoft.com/office/drawing/2014/main" xmlns="" id="{8DBD61DA-85D0-4639-AFCE-F80F48521BF1}"/>
+                <a16:creationId xmlns:a16="http://schemas.microsoft.com/office/drawing/2014/main" id="{8DBD61DA-85D0-4639-AFCE-F80F48521BF1}"/>
               </a:ext>
             </a:extLst>
           </p:cNvPr>
@@ -6835,7 +7698,7 @@
           <p:cNvPr id="3" name="Content Placeholder 2">
             <a:extLst>
               <a:ext uri="{FF2B5EF4-FFF2-40B4-BE49-F238E27FC236}">
-                <a16:creationId xmlns:a16="http://schemas.microsoft.com/office/drawing/2014/main" xmlns="" id="{42D4F774-BAD3-45DD-BF52-03C72E771D92}"/>
+                <a16:creationId xmlns:a16="http://schemas.microsoft.com/office/drawing/2014/main" id="{42D4F774-BAD3-45DD-BF52-03C72E771D92}"/>
               </a:ext>
             </a:extLst>
           </p:cNvPr>
@@ -6852,28 +7715,26 @@
           <a:lstStyle/>
           <a:p>
             <a:r>
-              <a:rPr lang="en-SG" dirty="0" smtClean="0"/>
+              <a:rPr lang="en-SG" dirty="0"/>
               <a:t>Definition</a:t>
             </a:r>
-            <a:endParaRPr lang="en-SG" dirty="0"/>
-          </a:p>
-          <a:p>
-            <a:r>
-              <a:rPr lang="en-SG" b="1" dirty="0" smtClean="0"/>
+          </a:p>
+          <a:p>
+            <a:r>
+              <a:rPr lang="en-SG" b="1" dirty="0"/>
               <a:t>Symbols</a:t>
             </a:r>
           </a:p>
           <a:p>
             <a:r>
-              <a:rPr lang="en-SG" dirty="0" smtClean="0"/>
+              <a:rPr lang="en-SG" dirty="0"/>
               <a:t>Flowchart constructs</a:t>
             </a:r>
-            <a:endParaRPr lang="en-SG" dirty="0"/>
           </a:p>
           <a:p>
             <a:r>
               <a:rPr lang="en-SG" dirty="0"/>
-              <a:t>Exercises</a:t>
+              <a:t>Examples and Exercises</a:t>
             </a:r>
           </a:p>
         </p:txBody>
@@ -6913,7 +7774,7 @@
           <p:cNvPr id="2" name="Title 1">
             <a:extLst>
               <a:ext uri="{FF2B5EF4-FFF2-40B4-BE49-F238E27FC236}">
-                <a16:creationId xmlns:a16="http://schemas.microsoft.com/office/drawing/2014/main" xmlns="" id="{8DBD61DA-85D0-4639-AFCE-F80F48521BF1}"/>
+                <a16:creationId xmlns:a16="http://schemas.microsoft.com/office/drawing/2014/main" id="{3B9115C0-1307-4D31-80B4-A1B28426B85F}"/>
               </a:ext>
             </a:extLst>
           </p:cNvPr>
@@ -6931,63 +7792,862 @@
           <a:p>
             <a:r>
               <a:rPr lang="en-SG" dirty="0"/>
-              <a:t>Contents</a:t>
-            </a:r>
-          </a:p>
-        </p:txBody>
-      </p:sp>
-      <p:sp>
-        <p:nvSpPr>
-          <p:cNvPr id="3" name="Content Placeholder 2">
+              <a:t>Symbols</a:t>
+            </a:r>
+          </a:p>
+        </p:txBody>
+      </p:sp>
+      <p:graphicFrame>
+        <p:nvGraphicFramePr>
+          <p:cNvPr id="4" name="Table 4">
             <a:extLst>
               <a:ext uri="{FF2B5EF4-FFF2-40B4-BE49-F238E27FC236}">
-                <a16:creationId xmlns:a16="http://schemas.microsoft.com/office/drawing/2014/main" xmlns="" id="{42D4F774-BAD3-45DD-BF52-03C72E771D92}"/>
+                <a16:creationId xmlns:a16="http://schemas.microsoft.com/office/drawing/2014/main" id="{E5E6D9C7-A490-41AD-AFFB-971D527D56D6}"/>
               </a:ext>
             </a:extLst>
           </p:cNvPr>
-          <p:cNvSpPr>
-            <a:spLocks noGrp="1"/>
-          </p:cNvSpPr>
+          <p:cNvGraphicFramePr>
+            <a:graphicFrameLocks noGrp="1"/>
+          </p:cNvGraphicFramePr>
           <p:nvPr>
             <p:ph idx="1"/>
-          </p:nvPr>
-        </p:nvSpPr>
-        <p:spPr/>
-        <p:txBody>
-          <a:bodyPr/>
-          <a:lstStyle/>
-          <a:p>
-            <a:r>
-              <a:rPr lang="en-SG" dirty="0" smtClean="0"/>
-              <a:t>Definition</a:t>
-            </a:r>
-            <a:endParaRPr lang="en-SG" dirty="0"/>
-          </a:p>
-          <a:p>
-            <a:r>
-              <a:rPr lang="en-SG" dirty="0" smtClean="0"/>
-              <a:t>Symbols</a:t>
-            </a:r>
-          </a:p>
-          <a:p>
-            <a:r>
-              <a:rPr lang="en-SG" b="1" dirty="0" smtClean="0"/>
-              <a:t>Flowchart constructs</a:t>
-            </a:r>
-            <a:endParaRPr lang="en-SG" b="1" dirty="0"/>
-          </a:p>
-          <a:p>
-            <a:r>
-              <a:rPr lang="en-SG" dirty="0"/>
-              <a:t>Exercises</a:t>
-            </a:r>
+            <p:extLst>
+              <p:ext uri="{D42A27DB-BD31-4B8C-83A1-F6EECF244321}">
+                <p14:modId xmlns:p14="http://schemas.microsoft.com/office/powerpoint/2010/main" val="3101599692"/>
+              </p:ext>
+            </p:extLst>
+          </p:nvPr>
+        </p:nvGraphicFramePr>
+        <p:xfrm>
+          <a:off x="1141413" y="2385793"/>
+          <a:ext cx="9906000" cy="4015007"/>
+        </p:xfrm>
+        <a:graphic>
+          <a:graphicData uri="http://schemas.openxmlformats.org/drawingml/2006/table">
+            <a:tbl>
+              <a:tblPr firstRow="1" bandRow="1">
+                <a:tableStyleId>{5C22544A-7EE6-4342-B048-85BDC9FD1C3A}</a:tableStyleId>
+              </a:tblPr>
+              <a:tblGrid>
+                <a:gridCol w="1974649">
+                  <a:extLst>
+                    <a:ext uri="{9D8B030D-6E8A-4147-A177-3AD203B41FA5}">
+                      <a16:colId xmlns:a16="http://schemas.microsoft.com/office/drawing/2014/main" val="4081056241"/>
+                    </a:ext>
+                  </a:extLst>
+                </a:gridCol>
+                <a:gridCol w="1047565">
+                  <a:extLst>
+                    <a:ext uri="{9D8B030D-6E8A-4147-A177-3AD203B41FA5}">
+                      <a16:colId xmlns:a16="http://schemas.microsoft.com/office/drawing/2014/main" val="2250206037"/>
+                    </a:ext>
+                  </a:extLst>
+                </a:gridCol>
+                <a:gridCol w="6883786">
+                  <a:extLst>
+                    <a:ext uri="{9D8B030D-6E8A-4147-A177-3AD203B41FA5}">
+                      <a16:colId xmlns:a16="http://schemas.microsoft.com/office/drawing/2014/main" val="1719728757"/>
+                    </a:ext>
+                  </a:extLst>
+                </a:gridCol>
+              </a:tblGrid>
+              <a:tr h="370840">
+                <a:tc>
+                  <a:txBody>
+                    <a:bodyPr/>
+                    <a:lstStyle/>
+                    <a:p>
+                      <a:pPr algn="ctr"/>
+                      <a:r>
+                        <a:rPr lang="en-SG" b="1" dirty="0"/>
+                        <a:t>Symbol Name</a:t>
+                      </a:r>
+                    </a:p>
+                  </a:txBody>
+                  <a:tcPr/>
+                </a:tc>
+                <a:tc>
+                  <a:txBody>
+                    <a:bodyPr/>
+                    <a:lstStyle/>
+                    <a:p>
+                      <a:pPr algn="ctr"/>
+                      <a:r>
+                        <a:rPr lang="en-SG" b="1" dirty="0"/>
+                        <a:t>Symbol</a:t>
+                      </a:r>
+                    </a:p>
+                  </a:txBody>
+                  <a:tcPr/>
+                </a:tc>
+                <a:tc>
+                  <a:txBody>
+                    <a:bodyPr/>
+                    <a:lstStyle/>
+                    <a:p>
+                      <a:pPr algn="ctr"/>
+                      <a:r>
+                        <a:rPr lang="en-SG" b="1" dirty="0"/>
+                        <a:t>Function</a:t>
+                      </a:r>
+                    </a:p>
+                  </a:txBody>
+                  <a:tcPr/>
+                </a:tc>
+                <a:extLst>
+                  <a:ext uri="{0D108BD9-81ED-4DB2-BD59-A6C34878D82A}">
+                    <a16:rowId xmlns:a16="http://schemas.microsoft.com/office/drawing/2014/main" val="3130788803"/>
+                  </a:ext>
+                </a:extLst>
+              </a:tr>
+              <a:tr h="370840">
+                <a:tc>
+                  <a:txBody>
+                    <a:bodyPr/>
+                    <a:lstStyle/>
+                    <a:p>
+                      <a:pPr algn="ctr"/>
+                      <a:r>
+                        <a:rPr lang="en-SG" b="0" dirty="0"/>
+                        <a:t>Oval</a:t>
+                      </a:r>
+                    </a:p>
+                  </a:txBody>
+                  <a:tcPr anchor="ctr"/>
+                </a:tc>
+                <a:tc>
+                  <a:txBody>
+                    <a:bodyPr/>
+                    <a:lstStyle/>
+                    <a:p>
+                      <a:pPr algn="ctr"/>
+                      <a:endParaRPr lang="en-SG" b="0" dirty="0"/>
+                    </a:p>
+                  </a:txBody>
+                  <a:tcPr anchor="ctr"/>
+                </a:tc>
+                <a:tc>
+                  <a:txBody>
+                    <a:bodyPr/>
+                    <a:lstStyle/>
+                    <a:p>
+                      <a:pPr algn="just"/>
+                      <a:r>
+                        <a:rPr lang="en-US" b="1" dirty="0"/>
+                        <a:t>Terminal:</a:t>
+                      </a:r>
+                      <a:r>
+                        <a:rPr lang="en-US" b="0" dirty="0"/>
+                        <a:t> Indicates start or end of the program or algorithm</a:t>
+                      </a:r>
+                      <a:endParaRPr lang="en-SG" b="0" dirty="0"/>
+                    </a:p>
+                  </a:txBody>
+                  <a:tcPr anchor="ctr"/>
+                </a:tc>
+                <a:extLst>
+                  <a:ext uri="{0D108BD9-81ED-4DB2-BD59-A6C34878D82A}">
+                    <a16:rowId xmlns:a16="http://schemas.microsoft.com/office/drawing/2014/main" val="858573057"/>
+                  </a:ext>
+                </a:extLst>
+              </a:tr>
+              <a:tr h="370840">
+                <a:tc>
+                  <a:txBody>
+                    <a:bodyPr/>
+                    <a:lstStyle/>
+                    <a:p>
+                      <a:pPr algn="ctr"/>
+                      <a:r>
+                        <a:rPr lang="en-SG" b="0" dirty="0"/>
+                        <a:t>Parallelogram</a:t>
+                      </a:r>
+                    </a:p>
+                  </a:txBody>
+                  <a:tcPr anchor="ctr"/>
+                </a:tc>
+                <a:tc>
+                  <a:txBody>
+                    <a:bodyPr/>
+                    <a:lstStyle/>
+                    <a:p>
+                      <a:pPr algn="ctr"/>
+                      <a:endParaRPr lang="en-SG" b="0" dirty="0"/>
+                    </a:p>
+                  </a:txBody>
+                  <a:tcPr anchor="ctr"/>
+                </a:tc>
+                <a:tc>
+                  <a:txBody>
+                    <a:bodyPr/>
+                    <a:lstStyle/>
+                    <a:p>
+                      <a:pPr algn="just"/>
+                      <a:r>
+                        <a:rPr lang="en-US" b="1" dirty="0"/>
+                        <a:t>Input/Output:</a:t>
+                      </a:r>
+                      <a:r>
+                        <a:rPr lang="en-US" b="0" dirty="0"/>
+                        <a:t> Input or output of data</a:t>
+                      </a:r>
+                      <a:endParaRPr lang="en-SG" b="0" dirty="0"/>
+                    </a:p>
+                  </a:txBody>
+                  <a:tcPr anchor="ctr"/>
+                </a:tc>
+                <a:extLst>
+                  <a:ext uri="{0D108BD9-81ED-4DB2-BD59-A6C34878D82A}">
+                    <a16:rowId xmlns:a16="http://schemas.microsoft.com/office/drawing/2014/main" val="4083966381"/>
+                  </a:ext>
+                </a:extLst>
+              </a:tr>
+              <a:tr h="370840">
+                <a:tc>
+                  <a:txBody>
+                    <a:bodyPr/>
+                    <a:lstStyle/>
+                    <a:p>
+                      <a:pPr algn="ctr"/>
+                      <a:r>
+                        <a:rPr lang="en-SG" b="0" dirty="0"/>
+                        <a:t>Rectangle</a:t>
+                      </a:r>
+                    </a:p>
+                  </a:txBody>
+                  <a:tcPr anchor="ctr"/>
+                </a:tc>
+                <a:tc>
+                  <a:txBody>
+                    <a:bodyPr/>
+                    <a:lstStyle/>
+                    <a:p>
+                      <a:pPr algn="ctr"/>
+                      <a:endParaRPr lang="en-SG" b="0" dirty="0"/>
+                    </a:p>
+                  </a:txBody>
+                  <a:tcPr anchor="ctr"/>
+                </a:tc>
+                <a:tc>
+                  <a:txBody>
+                    <a:bodyPr/>
+                    <a:lstStyle/>
+                    <a:p>
+                      <a:pPr algn="just"/>
+                      <a:r>
+                        <a:rPr lang="en-SG" b="1" dirty="0"/>
+                        <a:t>Process:</a:t>
+                      </a:r>
+                      <a:r>
+                        <a:rPr lang="en-SG" b="0" dirty="0"/>
+                        <a:t> </a:t>
+                      </a:r>
+                      <a:r>
+                        <a:rPr lang="en-US" b="0" dirty="0"/>
+                        <a:t>Any type of internal operation: data transformation, data movement, logic operation, etc.</a:t>
+                      </a:r>
+                      <a:endParaRPr lang="en-SG" b="0" dirty="0"/>
+                    </a:p>
+                  </a:txBody>
+                  <a:tcPr anchor="ctr"/>
+                </a:tc>
+                <a:extLst>
+                  <a:ext uri="{0D108BD9-81ED-4DB2-BD59-A6C34878D82A}">
+                    <a16:rowId xmlns:a16="http://schemas.microsoft.com/office/drawing/2014/main" val="257896216"/>
+                  </a:ext>
+                </a:extLst>
+              </a:tr>
+              <a:tr h="270720">
+                <a:tc>
+                  <a:txBody>
+                    <a:bodyPr/>
+                    <a:lstStyle/>
+                    <a:p>
+                      <a:pPr algn="ctr"/>
+                      <a:r>
+                        <a:rPr lang="en-SG" b="0" dirty="0"/>
+                        <a:t>Diamond</a:t>
+                      </a:r>
+                    </a:p>
+                  </a:txBody>
+                  <a:tcPr anchor="ctr"/>
+                </a:tc>
+                <a:tc>
+                  <a:txBody>
+                    <a:bodyPr/>
+                    <a:lstStyle/>
+                    <a:p>
+                      <a:pPr algn="ctr"/>
+                      <a:endParaRPr lang="en-SG" b="0" dirty="0"/>
+                    </a:p>
+                  </a:txBody>
+                  <a:tcPr anchor="ctr"/>
+                </a:tc>
+                <a:tc>
+                  <a:txBody>
+                    <a:bodyPr/>
+                    <a:lstStyle/>
+                    <a:p>
+                      <a:pPr algn="just"/>
+                      <a:r>
+                        <a:rPr lang="en-US" b="1" dirty="0"/>
+                        <a:t>Decision:</a:t>
+                      </a:r>
+                      <a:r>
+                        <a:rPr lang="en-US" b="0" dirty="0"/>
+                        <a:t> Evaluates a condition or statement and branches depending on whether the evaluation is true or false</a:t>
+                      </a:r>
+                      <a:endParaRPr lang="en-SG" b="0" dirty="0"/>
+                    </a:p>
+                  </a:txBody>
+                  <a:tcPr anchor="ctr"/>
+                </a:tc>
+                <a:extLst>
+                  <a:ext uri="{0D108BD9-81ED-4DB2-BD59-A6C34878D82A}">
+                    <a16:rowId xmlns:a16="http://schemas.microsoft.com/office/drawing/2014/main" val="2501390256"/>
+                  </a:ext>
+                </a:extLst>
+              </a:tr>
+              <a:tr h="982247">
+                <a:tc>
+                  <a:txBody>
+                    <a:bodyPr/>
+                    <a:lstStyle/>
+                    <a:p>
+                      <a:pPr algn="ctr"/>
+                      <a:r>
+                        <a:rPr lang="en-SG" b="0" dirty="0"/>
+                        <a:t>Arrows</a:t>
+                      </a:r>
+                    </a:p>
+                  </a:txBody>
+                  <a:tcPr anchor="ctr"/>
+                </a:tc>
+                <a:tc>
+                  <a:txBody>
+                    <a:bodyPr/>
+                    <a:lstStyle/>
+                    <a:p>
+                      <a:pPr algn="ctr"/>
+                      <a:endParaRPr lang="en-SG" b="0" dirty="0"/>
+                    </a:p>
+                  </a:txBody>
+                  <a:tcPr anchor="ctr"/>
+                </a:tc>
+                <a:tc>
+                  <a:txBody>
+                    <a:bodyPr/>
+                    <a:lstStyle/>
+                    <a:p>
+                      <a:pPr algn="just"/>
+                      <a:r>
+                        <a:rPr lang="en-US" b="1" dirty="0"/>
+                        <a:t>Flow lines:</a:t>
+                      </a:r>
+                      <a:r>
+                        <a:rPr lang="en-US" b="0" dirty="0"/>
+                        <a:t> Arrows that indicate the direction of the progression of the program</a:t>
+                      </a:r>
+                      <a:endParaRPr lang="en-SG" b="0" dirty="0"/>
+                    </a:p>
+                  </a:txBody>
+                  <a:tcPr anchor="ctr"/>
+                </a:tc>
+                <a:extLst>
+                  <a:ext uri="{0D108BD9-81ED-4DB2-BD59-A6C34878D82A}">
+                    <a16:rowId xmlns:a16="http://schemas.microsoft.com/office/drawing/2014/main" val="4178279705"/>
+                  </a:ext>
+                </a:extLst>
+              </a:tr>
+              <a:tr h="370840">
+                <a:tc>
+                  <a:txBody>
+                    <a:bodyPr/>
+                    <a:lstStyle/>
+                    <a:p>
+                      <a:pPr algn="ctr"/>
+                      <a:r>
+                        <a:rPr lang="en-SG" b="0" dirty="0"/>
+                        <a:t>Circle</a:t>
+                      </a:r>
+                    </a:p>
+                  </a:txBody>
+                  <a:tcPr anchor="ctr"/>
+                </a:tc>
+                <a:tc>
+                  <a:txBody>
+                    <a:bodyPr/>
+                    <a:lstStyle/>
+                    <a:p>
+                      <a:pPr algn="ctr"/>
+                      <a:endParaRPr lang="en-SG" b="0" dirty="0"/>
+                    </a:p>
+                  </a:txBody>
+                  <a:tcPr anchor="ctr"/>
+                </a:tc>
+                <a:tc>
+                  <a:txBody>
+                    <a:bodyPr/>
+                    <a:lstStyle/>
+                    <a:p>
+                      <a:pPr algn="just"/>
+                      <a:r>
+                        <a:rPr lang="en-US" b="1" dirty="0"/>
+                        <a:t>Connector:</a:t>
+                      </a:r>
+                      <a:r>
+                        <a:rPr lang="en-US" b="0" dirty="0"/>
+                        <a:t> Connects sections of the flowchart, so that the diagram can maintain a smooth, linear flow</a:t>
+                      </a:r>
+                      <a:endParaRPr lang="en-SG" b="0" dirty="0"/>
+                    </a:p>
+                  </a:txBody>
+                  <a:tcPr anchor="ctr"/>
+                </a:tc>
+                <a:extLst>
+                  <a:ext uri="{0D108BD9-81ED-4DB2-BD59-A6C34878D82A}">
+                    <a16:rowId xmlns:a16="http://schemas.microsoft.com/office/drawing/2014/main" val="338417646"/>
+                  </a:ext>
+                </a:extLst>
+              </a:tr>
+            </a:tbl>
+          </a:graphicData>
+        </a:graphic>
+      </p:graphicFrame>
+      <p:sp>
+        <p:nvSpPr>
+          <p:cNvPr id="6" name="Flowchart: Terminator 5">
+            <a:extLst>
+              <a:ext uri="{FF2B5EF4-FFF2-40B4-BE49-F238E27FC236}">
+                <a16:creationId xmlns:a16="http://schemas.microsoft.com/office/drawing/2014/main" id="{A88D09B1-70D5-44EC-A2BB-C730F5244118}"/>
+              </a:ext>
+            </a:extLst>
+          </p:cNvPr>
+          <p:cNvSpPr/>
+          <p:nvPr/>
+        </p:nvSpPr>
+        <p:spPr>
+          <a:xfrm>
+            <a:off x="3326960" y="2836812"/>
+            <a:ext cx="587514" cy="221942"/>
+          </a:xfrm>
+          <a:prstGeom prst="flowChartTerminator">
+            <a:avLst/>
+          </a:prstGeom>
+          <a:noFill/>
+        </p:spPr>
+        <p:style>
+          <a:lnRef idx="2">
+            <a:schemeClr val="dk1"/>
+          </a:lnRef>
+          <a:fillRef idx="1">
+            <a:schemeClr val="lt1"/>
+          </a:fillRef>
+          <a:effectRef idx="0">
+            <a:schemeClr val="dk1"/>
+          </a:effectRef>
+          <a:fontRef idx="minor">
+            <a:schemeClr val="dk1"/>
+          </a:fontRef>
+        </p:style>
+        <p:txBody>
+          <a:bodyPr rtlCol="0" anchor="ctr"/>
+          <a:lstStyle/>
+          <a:p>
+            <a:pPr algn="ctr"/>
+            <a:endParaRPr lang="en-SG"/>
+          </a:p>
+        </p:txBody>
+      </p:sp>
+      <p:sp>
+        <p:nvSpPr>
+          <p:cNvPr id="7" name="Parallelogram 6">
+            <a:extLst>
+              <a:ext uri="{FF2B5EF4-FFF2-40B4-BE49-F238E27FC236}">
+                <a16:creationId xmlns:a16="http://schemas.microsoft.com/office/drawing/2014/main" id="{EB5C4425-2D4B-4019-B38E-4BC54C64A6A2}"/>
+              </a:ext>
+            </a:extLst>
+          </p:cNvPr>
+          <p:cNvSpPr/>
+          <p:nvPr/>
+        </p:nvSpPr>
+        <p:spPr>
+          <a:xfrm>
+            <a:off x="3316558" y="3208890"/>
+            <a:ext cx="587514" cy="223200"/>
+          </a:xfrm>
+          <a:prstGeom prst="parallelogram">
+            <a:avLst/>
+          </a:prstGeom>
+          <a:noFill/>
+        </p:spPr>
+        <p:style>
+          <a:lnRef idx="2">
+            <a:schemeClr val="dk1"/>
+          </a:lnRef>
+          <a:fillRef idx="1">
+            <a:schemeClr val="lt1"/>
+          </a:fillRef>
+          <a:effectRef idx="0">
+            <a:schemeClr val="dk1"/>
+          </a:effectRef>
+          <a:fontRef idx="minor">
+            <a:schemeClr val="dk1"/>
+          </a:fontRef>
+        </p:style>
+        <p:txBody>
+          <a:bodyPr rtlCol="0" anchor="ctr"/>
+          <a:lstStyle/>
+          <a:p>
+            <a:pPr algn="ctr"/>
+            <a:endParaRPr lang="en-SG"/>
+          </a:p>
+        </p:txBody>
+      </p:sp>
+      <p:sp>
+        <p:nvSpPr>
+          <p:cNvPr id="8" name="Rectangle 7">
+            <a:extLst>
+              <a:ext uri="{FF2B5EF4-FFF2-40B4-BE49-F238E27FC236}">
+                <a16:creationId xmlns:a16="http://schemas.microsoft.com/office/drawing/2014/main" id="{D77CF748-CE94-4A60-AC32-5A73C59CABD8}"/>
+              </a:ext>
+            </a:extLst>
+          </p:cNvPr>
+          <p:cNvSpPr/>
+          <p:nvPr/>
+        </p:nvSpPr>
+        <p:spPr>
+          <a:xfrm>
+            <a:off x="3316558" y="3703404"/>
+            <a:ext cx="586800" cy="223200"/>
+          </a:xfrm>
+          <a:prstGeom prst="rect">
+            <a:avLst/>
+          </a:prstGeom>
+          <a:noFill/>
+        </p:spPr>
+        <p:style>
+          <a:lnRef idx="2">
+            <a:schemeClr val="dk1"/>
+          </a:lnRef>
+          <a:fillRef idx="1">
+            <a:schemeClr val="lt1"/>
+          </a:fillRef>
+          <a:effectRef idx="0">
+            <a:schemeClr val="dk1"/>
+          </a:effectRef>
+          <a:fontRef idx="minor">
+            <a:schemeClr val="dk1"/>
+          </a:fontRef>
+        </p:style>
+        <p:txBody>
+          <a:bodyPr rtlCol="0" anchor="ctr"/>
+          <a:lstStyle/>
+          <a:p>
+            <a:pPr algn="ctr"/>
+            <a:endParaRPr lang="en-SG"/>
+          </a:p>
+        </p:txBody>
+      </p:sp>
+      <p:sp>
+        <p:nvSpPr>
+          <p:cNvPr id="9" name="Diamond 8">
+            <a:extLst>
+              <a:ext uri="{FF2B5EF4-FFF2-40B4-BE49-F238E27FC236}">
+                <a16:creationId xmlns:a16="http://schemas.microsoft.com/office/drawing/2014/main" id="{377FB017-D7BD-4693-838F-54AED82B752E}"/>
+              </a:ext>
+            </a:extLst>
+          </p:cNvPr>
+          <p:cNvSpPr/>
+          <p:nvPr/>
+        </p:nvSpPr>
+        <p:spPr>
+          <a:xfrm>
+            <a:off x="3422717" y="4318986"/>
+            <a:ext cx="396000" cy="223200"/>
+          </a:xfrm>
+          <a:prstGeom prst="diamond">
+            <a:avLst/>
+          </a:prstGeom>
+          <a:noFill/>
+        </p:spPr>
+        <p:style>
+          <a:lnRef idx="2">
+            <a:schemeClr val="dk1"/>
+          </a:lnRef>
+          <a:fillRef idx="1">
+            <a:schemeClr val="lt1"/>
+          </a:fillRef>
+          <a:effectRef idx="0">
+            <a:schemeClr val="dk1"/>
+          </a:effectRef>
+          <a:fontRef idx="minor">
+            <a:schemeClr val="dk1"/>
+          </a:fontRef>
+        </p:style>
+        <p:txBody>
+          <a:bodyPr rtlCol="0" anchor="ctr"/>
+          <a:lstStyle/>
+          <a:p>
+            <a:pPr algn="ctr"/>
+            <a:endParaRPr lang="en-SG"/>
+          </a:p>
+        </p:txBody>
+      </p:sp>
+      <p:grpSp>
+        <p:nvGrpSpPr>
+          <p:cNvPr id="15" name="Group 14">
+            <a:extLst>
+              <a:ext uri="{FF2B5EF4-FFF2-40B4-BE49-F238E27FC236}">
+                <a16:creationId xmlns:a16="http://schemas.microsoft.com/office/drawing/2014/main" id="{CE26FC1D-6F4D-46AB-B845-B53911AF4DF9}"/>
+              </a:ext>
+            </a:extLst>
+          </p:cNvPr>
+          <p:cNvGrpSpPr/>
+          <p:nvPr/>
+        </p:nvGrpSpPr>
+        <p:grpSpPr>
+          <a:xfrm>
+            <a:off x="3173874" y="4879209"/>
+            <a:ext cx="893686" cy="741548"/>
+            <a:chOff x="5695049" y="4619423"/>
+            <a:chExt cx="893686" cy="741548"/>
+          </a:xfrm>
+        </p:grpSpPr>
+        <p:sp>
+          <p:nvSpPr>
+            <p:cNvPr id="10" name="Arrow: Left 9">
+              <a:extLst>
+                <a:ext uri="{FF2B5EF4-FFF2-40B4-BE49-F238E27FC236}">
+                  <a16:creationId xmlns:a16="http://schemas.microsoft.com/office/drawing/2014/main" id="{B058CC73-ECD8-435D-93B5-0309335684D9}"/>
+                </a:ext>
+              </a:extLst>
+            </p:cNvPr>
+            <p:cNvSpPr/>
+            <p:nvPr/>
+          </p:nvSpPr>
+          <p:spPr>
+            <a:xfrm>
+              <a:off x="5695049" y="4953740"/>
+              <a:ext cx="285368" cy="71021"/>
+            </a:xfrm>
+            <a:prstGeom prst="leftArrow">
+              <a:avLst/>
+            </a:prstGeom>
+          </p:spPr>
+          <p:style>
+            <a:lnRef idx="2">
+              <a:schemeClr val="accent1">
+                <a:shade val="50000"/>
+              </a:schemeClr>
+            </a:lnRef>
+            <a:fillRef idx="1">
+              <a:schemeClr val="accent1"/>
+            </a:fillRef>
+            <a:effectRef idx="0">
+              <a:schemeClr val="accent1"/>
+            </a:effectRef>
+            <a:fontRef idx="minor">
+              <a:schemeClr val="lt1"/>
+            </a:fontRef>
+          </p:style>
+          <p:txBody>
+            <a:bodyPr rtlCol="0" anchor="ctr"/>
+            <a:lstStyle/>
+            <a:p>
+              <a:pPr algn="ctr"/>
+              <a:endParaRPr lang="en-SG"/>
+            </a:p>
+          </p:txBody>
+        </p:sp>
+        <p:sp>
+          <p:nvSpPr>
+            <p:cNvPr id="11" name="Arrow: Right 10">
+              <a:extLst>
+                <a:ext uri="{FF2B5EF4-FFF2-40B4-BE49-F238E27FC236}">
+                  <a16:creationId xmlns:a16="http://schemas.microsoft.com/office/drawing/2014/main" id="{589FC49F-60F1-4582-AA5F-F196D8EFB6D3}"/>
+                </a:ext>
+              </a:extLst>
+            </p:cNvPr>
+            <p:cNvSpPr/>
+            <p:nvPr/>
+          </p:nvSpPr>
+          <p:spPr>
+            <a:xfrm>
+              <a:off x="6303367" y="4953740"/>
+              <a:ext cx="285368" cy="72000"/>
+            </a:xfrm>
+            <a:prstGeom prst="rightArrow">
+              <a:avLst/>
+            </a:prstGeom>
+          </p:spPr>
+          <p:style>
+            <a:lnRef idx="2">
+              <a:schemeClr val="accent1">
+                <a:shade val="50000"/>
+              </a:schemeClr>
+            </a:lnRef>
+            <a:fillRef idx="1">
+              <a:schemeClr val="accent1"/>
+            </a:fillRef>
+            <a:effectRef idx="0">
+              <a:schemeClr val="accent1"/>
+            </a:effectRef>
+            <a:fontRef idx="minor">
+              <a:schemeClr val="lt1"/>
+            </a:fontRef>
+          </p:style>
+          <p:txBody>
+            <a:bodyPr rtlCol="0" anchor="ctr"/>
+            <a:lstStyle/>
+            <a:p>
+              <a:pPr algn="ctr"/>
+              <a:endParaRPr lang="en-SG"/>
+            </a:p>
+          </p:txBody>
+        </p:sp>
+        <p:sp>
+          <p:nvSpPr>
+            <p:cNvPr id="12" name="Arrow: Down 11">
+              <a:extLst>
+                <a:ext uri="{FF2B5EF4-FFF2-40B4-BE49-F238E27FC236}">
+                  <a16:creationId xmlns:a16="http://schemas.microsoft.com/office/drawing/2014/main" id="{BB3D2734-ADC7-4558-B954-08B9CDCC12F1}"/>
+                </a:ext>
+              </a:extLst>
+            </p:cNvPr>
+            <p:cNvSpPr/>
+            <p:nvPr/>
+          </p:nvSpPr>
+          <p:spPr>
+            <a:xfrm>
+              <a:off x="6087696" y="5058896"/>
+              <a:ext cx="92666" cy="302075"/>
+            </a:xfrm>
+            <a:prstGeom prst="downArrow">
+              <a:avLst/>
+            </a:prstGeom>
+          </p:spPr>
+          <p:style>
+            <a:lnRef idx="2">
+              <a:schemeClr val="accent1">
+                <a:shade val="50000"/>
+              </a:schemeClr>
+            </a:lnRef>
+            <a:fillRef idx="1">
+              <a:schemeClr val="accent1"/>
+            </a:fillRef>
+            <a:effectRef idx="0">
+              <a:schemeClr val="accent1"/>
+            </a:effectRef>
+            <a:fontRef idx="minor">
+              <a:schemeClr val="lt1"/>
+            </a:fontRef>
+          </p:style>
+          <p:txBody>
+            <a:bodyPr rtlCol="0" anchor="ctr"/>
+            <a:lstStyle/>
+            <a:p>
+              <a:pPr algn="ctr"/>
+              <a:endParaRPr lang="en-SG"/>
+            </a:p>
+          </p:txBody>
+        </p:sp>
+        <p:sp>
+          <p:nvSpPr>
+            <p:cNvPr id="13" name="Arrow: Up 12">
+              <a:extLst>
+                <a:ext uri="{FF2B5EF4-FFF2-40B4-BE49-F238E27FC236}">
+                  <a16:creationId xmlns:a16="http://schemas.microsoft.com/office/drawing/2014/main" id="{1FDEE526-4C12-416B-BA93-6203E4AE546C}"/>
+                </a:ext>
+              </a:extLst>
+            </p:cNvPr>
+            <p:cNvSpPr/>
+            <p:nvPr/>
+          </p:nvSpPr>
+          <p:spPr>
+            <a:xfrm>
+              <a:off x="6087255" y="4619423"/>
+              <a:ext cx="92666" cy="302075"/>
+            </a:xfrm>
+            <a:prstGeom prst="upArrow">
+              <a:avLst/>
+            </a:prstGeom>
+          </p:spPr>
+          <p:style>
+            <a:lnRef idx="2">
+              <a:schemeClr val="accent1">
+                <a:shade val="50000"/>
+              </a:schemeClr>
+            </a:lnRef>
+            <a:fillRef idx="1">
+              <a:schemeClr val="accent1"/>
+            </a:fillRef>
+            <a:effectRef idx="0">
+              <a:schemeClr val="accent1"/>
+            </a:effectRef>
+            <a:fontRef idx="minor">
+              <a:schemeClr val="lt1"/>
+            </a:fontRef>
+          </p:style>
+          <p:txBody>
+            <a:bodyPr rtlCol="0" anchor="ctr"/>
+            <a:lstStyle/>
+            <a:p>
+              <a:pPr algn="ctr"/>
+              <a:endParaRPr lang="en-SG" dirty="0"/>
+            </a:p>
+          </p:txBody>
+        </p:sp>
+      </p:grpSp>
+      <p:sp>
+        <p:nvSpPr>
+          <p:cNvPr id="16" name="Flowchart: Connector 15">
+            <a:extLst>
+              <a:ext uri="{FF2B5EF4-FFF2-40B4-BE49-F238E27FC236}">
+                <a16:creationId xmlns:a16="http://schemas.microsoft.com/office/drawing/2014/main" id="{1DA9A62D-567C-4BDB-B721-A9B4EAAC159E}"/>
+              </a:ext>
+            </a:extLst>
+          </p:cNvPr>
+          <p:cNvSpPr/>
+          <p:nvPr/>
+        </p:nvSpPr>
+        <p:spPr>
+          <a:xfrm>
+            <a:off x="3501902" y="5910443"/>
+            <a:ext cx="216112" cy="223200"/>
+          </a:xfrm>
+          <a:prstGeom prst="flowChartConnector">
+            <a:avLst/>
+          </a:prstGeom>
+          <a:noFill/>
+        </p:spPr>
+        <p:style>
+          <a:lnRef idx="2">
+            <a:schemeClr val="dk1"/>
+          </a:lnRef>
+          <a:fillRef idx="1">
+            <a:schemeClr val="lt1"/>
+          </a:fillRef>
+          <a:effectRef idx="0">
+            <a:schemeClr val="dk1"/>
+          </a:effectRef>
+          <a:fontRef idx="minor">
+            <a:schemeClr val="dk1"/>
+          </a:fontRef>
+        </p:style>
+        <p:txBody>
+          <a:bodyPr rtlCol="0" anchor="ctr"/>
+          <a:lstStyle/>
+          <a:p>
+            <a:pPr algn="ctr"/>
+            <a:endParaRPr lang="en-SG"/>
           </a:p>
         </p:txBody>
       </p:sp>
     </p:spTree>
     <p:extLst>
       <p:ext uri="{BB962C8B-B14F-4D97-AF65-F5344CB8AC3E}">
-        <p14:creationId xmlns:p14="http://schemas.microsoft.com/office/powerpoint/2010/main" val="4226165605"/>
+        <p14:creationId xmlns:p14="http://schemas.microsoft.com/office/powerpoint/2010/main" val="2317900324"/>
       </p:ext>
     </p:extLst>
   </p:cSld>
@@ -7019,7 +8679,7 @@
           <p:cNvPr id="2" name="Title 1">
             <a:extLst>
               <a:ext uri="{FF2B5EF4-FFF2-40B4-BE49-F238E27FC236}">
-                <a16:creationId xmlns:a16="http://schemas.microsoft.com/office/drawing/2014/main" xmlns="" id="{8DBD61DA-85D0-4639-AFCE-F80F48521BF1}"/>
+                <a16:creationId xmlns:a16="http://schemas.microsoft.com/office/drawing/2014/main" id="{8DBD61DA-85D0-4639-AFCE-F80F48521BF1}"/>
               </a:ext>
             </a:extLst>
           </p:cNvPr>
@@ -7047,7 +8707,7 @@
           <p:cNvPr id="3" name="Content Placeholder 2">
             <a:extLst>
               <a:ext uri="{FF2B5EF4-FFF2-40B4-BE49-F238E27FC236}">
-                <a16:creationId xmlns:a16="http://schemas.microsoft.com/office/drawing/2014/main" xmlns="" id="{42D4F774-BAD3-45DD-BF52-03C72E771D92}"/>
+                <a16:creationId xmlns:a16="http://schemas.microsoft.com/office/drawing/2014/main" id="{42D4F774-BAD3-45DD-BF52-03C72E771D92}"/>
               </a:ext>
             </a:extLst>
           </p:cNvPr>
@@ -7064,28 +8724,26 @@
           <a:lstStyle/>
           <a:p>
             <a:r>
-              <a:rPr lang="en-SG" dirty="0" smtClean="0"/>
+              <a:rPr lang="en-SG" dirty="0"/>
               <a:t>Definition</a:t>
             </a:r>
-            <a:endParaRPr lang="en-SG" dirty="0"/>
-          </a:p>
-          <a:p>
-            <a:r>
-              <a:rPr lang="en-SG" dirty="0" smtClean="0"/>
+          </a:p>
+          <a:p>
+            <a:r>
+              <a:rPr lang="en-SG" dirty="0"/>
               <a:t>Symbols</a:t>
             </a:r>
           </a:p>
           <a:p>
             <a:r>
-              <a:rPr lang="en-SG" dirty="0" smtClean="0"/>
+              <a:rPr lang="en-SG" b="1" dirty="0"/>
               <a:t>Flowchart constructs</a:t>
             </a:r>
-            <a:endParaRPr lang="en-SG" dirty="0"/>
-          </a:p>
-          <a:p>
-            <a:r>
-              <a:rPr lang="en-SG" b="1" dirty="0"/>
-              <a:t>Exercises</a:t>
+          </a:p>
+          <a:p>
+            <a:r>
+              <a:rPr lang="en-SG" dirty="0"/>
+              <a:t>Examples and Exercises</a:t>
             </a:r>
           </a:p>
         </p:txBody>
@@ -7093,7 +8751,7 @@
     </p:spTree>
     <p:extLst>
       <p:ext uri="{BB962C8B-B14F-4D97-AF65-F5344CB8AC3E}">
-        <p14:creationId xmlns:p14="http://schemas.microsoft.com/office/powerpoint/2010/main" val="3183918338"/>
+        <p14:creationId xmlns:p14="http://schemas.microsoft.com/office/powerpoint/2010/main" val="4226165605"/>
       </p:ext>
     </p:extLst>
   </p:cSld>
@@ -7125,7 +8783,7 @@
           <p:cNvPr id="2" name="Title 1">
             <a:extLst>
               <a:ext uri="{FF2B5EF4-FFF2-40B4-BE49-F238E27FC236}">
-                <a16:creationId xmlns:a16="http://schemas.microsoft.com/office/drawing/2014/main" xmlns="" id="{852EC85B-4C5A-452F-BFA9-01CCA4D36D5A}"/>
+                <a16:creationId xmlns:a16="http://schemas.microsoft.com/office/drawing/2014/main" id="{1C825F26-06D6-44AF-95D9-B5363204494F}"/>
               </a:ext>
             </a:extLst>
           </p:cNvPr>
@@ -7143,153 +8801,53 @@
           <a:p>
             <a:r>
               <a:rPr lang="en-SG" dirty="0"/>
-              <a:t>Exercise 1</a:t>
-            </a:r>
-          </a:p>
-        </p:txBody>
-      </p:sp>
-      <mc:AlternateContent xmlns:mc="http://schemas.openxmlformats.org/markup-compatibility/2006" xmlns:a14="http://schemas.microsoft.com/office/drawing/2010/main">
-        <mc:Choice Requires="a14">
-          <p:sp>
-            <p:nvSpPr>
-              <p:cNvPr id="3" name="Content Placeholder 2">
-                <a:extLst>
-                  <a:ext uri="{FF2B5EF4-FFF2-40B4-BE49-F238E27FC236}">
-                    <a16:creationId xmlns:a16="http://schemas.microsoft.com/office/drawing/2014/main" xmlns="" id="{71FB0D52-1AFA-493D-BCCD-5563D69A7671}"/>
-                  </a:ext>
-                </a:extLst>
-              </p:cNvPr>
-              <p:cNvSpPr>
-                <a:spLocks noGrp="1"/>
-              </p:cNvSpPr>
-              <p:nvPr>
-                <p:ph idx="1"/>
-              </p:nvPr>
-            </p:nvSpPr>
-            <p:spPr/>
-            <p:txBody>
-              <a:bodyPr/>
-              <a:lstStyle/>
-              <a:p>
-                <a:r>
-                  <a:rPr lang="en-SG" dirty="0"/>
-                  <a:t>Write the </a:t>
-                </a:r>
-                <a:r>
-                  <a:rPr lang="en-US" dirty="0"/>
-                  <a:t>Algorithm to convert temperature from Celsius to Fahrenheit</a:t>
-                </a:r>
-              </a:p>
-              <a:p>
-                <a:r>
-                  <a:rPr lang="en-US" dirty="0"/>
-                  <a:t>Hint: </a:t>
-                </a:r>
-                <a14:m>
-                  <m:oMath xmlns:m="http://schemas.openxmlformats.org/officeDocument/2006/math">
-                    <m:r>
-                      <m:rPr>
-                        <m:sty m:val="p"/>
-                      </m:rPr>
-                      <a:rPr lang="en-SG" b="0" i="0" smtClean="0">
-                        <a:latin typeface="Cambria Math" panose="02040503050406030204" pitchFamily="18" charset="0"/>
-                      </a:rPr>
-                      <m:t>F</m:t>
-                    </m:r>
-                    <m:r>
-                      <a:rPr lang="en-SG" b="0" i="0" smtClean="0">
-                        <a:latin typeface="Cambria Math" panose="02040503050406030204" pitchFamily="18" charset="0"/>
-                      </a:rPr>
-                      <m:t>=</m:t>
-                    </m:r>
-                    <m:f>
-                      <m:fPr>
-                        <m:ctrlPr>
-                          <a:rPr lang="en-US" i="1" smtClean="0">
-                            <a:latin typeface="Cambria Math" panose="02040503050406030204" pitchFamily="18" charset="0"/>
-                          </a:rPr>
-                        </m:ctrlPr>
-                      </m:fPr>
-                      <m:num>
-                        <m:r>
-                          <a:rPr lang="en-SG" b="0" i="1" smtClean="0">
-                            <a:latin typeface="Cambria Math" panose="02040503050406030204" pitchFamily="18" charset="0"/>
-                          </a:rPr>
-                          <m:t>9</m:t>
-                        </m:r>
-                      </m:num>
-                      <m:den>
-                        <m:r>
-                          <a:rPr lang="en-SG" b="0" i="1" smtClean="0">
-                            <a:latin typeface="Cambria Math" panose="02040503050406030204" pitchFamily="18" charset="0"/>
-                          </a:rPr>
-                          <m:t>5</m:t>
-                        </m:r>
-                      </m:den>
-                    </m:f>
-                    <m:r>
-                      <a:rPr lang="en-SG" b="0" i="1" smtClean="0">
-                        <a:latin typeface="Cambria Math" panose="02040503050406030204" pitchFamily="18" charset="0"/>
-                      </a:rPr>
-                      <m:t>𝐶</m:t>
-                    </m:r>
-                    <m:r>
-                      <a:rPr lang="en-SG" b="0" i="1" smtClean="0">
-                        <a:latin typeface="Cambria Math" panose="02040503050406030204" pitchFamily="18" charset="0"/>
-                      </a:rPr>
-                      <m:t>+32</m:t>
-                    </m:r>
-                  </m:oMath>
-                </a14:m>
-                <a:endParaRPr lang="en-SG" dirty="0"/>
-              </a:p>
-            </p:txBody>
-          </p:sp>
-        </mc:Choice>
-        <mc:Fallback xmlns="">
-          <p:sp>
-            <p:nvSpPr>
-              <p:cNvPr id="3" name="Content Placeholder 2">
-                <a:extLst>
-                  <a:ext uri="{FF2B5EF4-FFF2-40B4-BE49-F238E27FC236}">
-                    <a16:creationId xmlns:a16="http://schemas.microsoft.com/office/drawing/2014/main" id="{71FB0D52-1AFA-493D-BCCD-5563D69A7671}"/>
-                  </a:ext>
-                </a:extLst>
-              </p:cNvPr>
-              <p:cNvSpPr>
-                <a:spLocks noGrp="1" noRot="1" noChangeAspect="1" noMove="1" noResize="1" noEditPoints="1" noAdjustHandles="1" noChangeArrowheads="1" noChangeShapeType="1" noTextEdit="1"/>
-              </p:cNvSpPr>
-              <p:nvPr>
-                <p:ph idx="1"/>
-              </p:nvPr>
-            </p:nvSpPr>
-            <p:spPr>
-              <a:blipFill>
-                <a:blip r:embed="rId2"/>
-                <a:stretch>
-                  <a:fillRect l="-1046"/>
-                </a:stretch>
-              </a:blipFill>
-            </p:spPr>
-            <p:txBody>
-              <a:bodyPr/>
-              <a:lstStyle/>
-              <a:p>
-                <a:r>
-                  <a:rPr lang="en-SG">
-                    <a:noFill/>
-                  </a:rPr>
-                  <a:t> </a:t>
-                </a:r>
-              </a:p>
-            </p:txBody>
-          </p:sp>
-        </mc:Fallback>
-      </mc:AlternateContent>
+              <a:t>Sequence</a:t>
+            </a:r>
+          </a:p>
+        </p:txBody>
+      </p:sp>
+      <p:pic>
+        <p:nvPicPr>
+          <p:cNvPr id="11" name="Content Placeholder 10">
+            <a:extLst>
+              <a:ext uri="{FF2B5EF4-FFF2-40B4-BE49-F238E27FC236}">
+                <a16:creationId xmlns:a16="http://schemas.microsoft.com/office/drawing/2014/main" id="{B46F75B1-18A5-4122-A0BE-D1C01C2090D2}"/>
+              </a:ext>
+            </a:extLst>
+          </p:cNvPr>
+          <p:cNvPicPr>
+            <a:picLocks noGrp="1" noChangeAspect="1"/>
+          </p:cNvPicPr>
+          <p:nvPr>
+            <p:ph idx="1"/>
+          </p:nvPr>
+        </p:nvPicPr>
+        <p:blipFill>
+          <a:blip r:embed="rId2">
+            <a:extLst>
+              <a:ext uri="{28A0092B-C50C-407E-A947-70E740481C1C}">
+                <a14:useLocalDpi xmlns:a14="http://schemas.microsoft.com/office/drawing/2010/main" val="0"/>
+              </a:ext>
+            </a:extLst>
+          </a:blip>
+          <a:stretch>
+            <a:fillRect/>
+          </a:stretch>
+        </p:blipFill>
+        <p:spPr>
+          <a:xfrm>
+            <a:off x="5280024" y="1897602"/>
+            <a:ext cx="1628775" cy="4086225"/>
+          </a:xfrm>
+          <a:solidFill>
+            <a:schemeClr val="tx1"/>
+          </a:solidFill>
+        </p:spPr>
+      </p:pic>
     </p:spTree>
     <p:extLst>
       <p:ext uri="{BB962C8B-B14F-4D97-AF65-F5344CB8AC3E}">
-        <p14:creationId xmlns:p14="http://schemas.microsoft.com/office/powerpoint/2010/main" val="2975984063"/>
+        <p14:creationId xmlns:p14="http://schemas.microsoft.com/office/powerpoint/2010/main" val="3642864833"/>
       </p:ext>
     </p:extLst>
   </p:cSld>
@@ -7321,7 +8879,7 @@
           <p:cNvPr id="2" name="Title 1">
             <a:extLst>
               <a:ext uri="{FF2B5EF4-FFF2-40B4-BE49-F238E27FC236}">
-                <a16:creationId xmlns:a16="http://schemas.microsoft.com/office/drawing/2014/main" xmlns="" id="{852EC85B-4C5A-452F-BFA9-01CCA4D36D5A}"/>
+                <a16:creationId xmlns:a16="http://schemas.microsoft.com/office/drawing/2014/main" id="{1C825F26-06D6-44AF-95D9-B5363204494F}"/>
               </a:ext>
             </a:extLst>
           </p:cNvPr>
@@ -7339,47 +8897,53 @@
           <a:p>
             <a:r>
               <a:rPr lang="en-SG" dirty="0"/>
-              <a:t>Exercise 2</a:t>
-            </a:r>
-          </a:p>
-        </p:txBody>
-      </p:sp>
-      <p:sp>
-        <p:nvSpPr>
-          <p:cNvPr id="3" name="Content Placeholder 2">
+              <a:t>Branching (Selection)</a:t>
+            </a:r>
+          </a:p>
+        </p:txBody>
+      </p:sp>
+      <p:pic>
+        <p:nvPicPr>
+          <p:cNvPr id="6" name="Content Placeholder 5">
             <a:extLst>
               <a:ext uri="{FF2B5EF4-FFF2-40B4-BE49-F238E27FC236}">
-                <a16:creationId xmlns:a16="http://schemas.microsoft.com/office/drawing/2014/main" xmlns="" id="{71FB0D52-1AFA-493D-BCCD-5563D69A7671}"/>
+                <a16:creationId xmlns:a16="http://schemas.microsoft.com/office/drawing/2014/main" id="{8319DC4B-9457-4489-8261-10CA59D2369C}"/>
               </a:ext>
             </a:extLst>
           </p:cNvPr>
-          <p:cNvSpPr>
-            <a:spLocks noGrp="1"/>
-          </p:cNvSpPr>
+          <p:cNvPicPr>
+            <a:picLocks noGrp="1" noChangeAspect="1"/>
+          </p:cNvPicPr>
           <p:nvPr>
             <p:ph idx="1"/>
           </p:nvPr>
-        </p:nvSpPr>
-        <p:spPr/>
-        <p:txBody>
-          <a:bodyPr/>
-          <a:lstStyle/>
-          <a:p>
-            <a:r>
-              <a:rPr lang="en-SG" dirty="0"/>
-              <a:t>Write the </a:t>
-            </a:r>
-            <a:r>
-              <a:rPr lang="en-US" dirty="0"/>
-              <a:t>Algorithm to find the largest of two numbers</a:t>
-            </a:r>
-          </a:p>
-        </p:txBody>
-      </p:sp>
+        </p:nvPicPr>
+        <p:blipFill>
+          <a:blip r:embed="rId2">
+            <a:extLst>
+              <a:ext uri="{28A0092B-C50C-407E-A947-70E740481C1C}">
+                <a14:useLocalDpi xmlns:a14="http://schemas.microsoft.com/office/drawing/2010/main" val="0"/>
+              </a:ext>
+            </a:extLst>
+          </a:blip>
+          <a:stretch>
+            <a:fillRect/>
+          </a:stretch>
+        </p:blipFill>
+        <p:spPr>
+          <a:xfrm>
+            <a:off x="2831147" y="2223654"/>
+            <a:ext cx="6526530" cy="3669030"/>
+          </a:xfrm>
+          <a:solidFill>
+            <a:schemeClr val="tx1"/>
+          </a:solidFill>
+        </p:spPr>
+      </p:pic>
     </p:spTree>
     <p:extLst>
       <p:ext uri="{BB962C8B-B14F-4D97-AF65-F5344CB8AC3E}">
-        <p14:creationId xmlns:p14="http://schemas.microsoft.com/office/powerpoint/2010/main" val="320625042"/>
+        <p14:creationId xmlns:p14="http://schemas.microsoft.com/office/powerpoint/2010/main" val="4157058366"/>
       </p:ext>
     </p:extLst>
   </p:cSld>
@@ -7411,7 +8975,7 @@
           <p:cNvPr id="2" name="Title 1">
             <a:extLst>
               <a:ext uri="{FF2B5EF4-FFF2-40B4-BE49-F238E27FC236}">
-                <a16:creationId xmlns:a16="http://schemas.microsoft.com/office/drawing/2014/main" xmlns="" id="{852EC85B-4C5A-452F-BFA9-01CCA4D36D5A}"/>
+                <a16:creationId xmlns:a16="http://schemas.microsoft.com/office/drawing/2014/main" id="{1C825F26-06D6-44AF-95D9-B5363204494F}"/>
               </a:ext>
             </a:extLst>
           </p:cNvPr>
@@ -7429,47 +8993,53 @@
           <a:p>
             <a:r>
               <a:rPr lang="en-SG" dirty="0"/>
-              <a:t>Exercise 3</a:t>
-            </a:r>
-          </a:p>
-        </p:txBody>
-      </p:sp>
-      <p:sp>
-        <p:nvSpPr>
-          <p:cNvPr id="3" name="Content Placeholder 2">
+              <a:t>Loop (Repetition)</a:t>
+            </a:r>
+          </a:p>
+        </p:txBody>
+      </p:sp>
+      <p:pic>
+        <p:nvPicPr>
+          <p:cNvPr id="7" name="Content Placeholder 6">
             <a:extLst>
               <a:ext uri="{FF2B5EF4-FFF2-40B4-BE49-F238E27FC236}">
-                <a16:creationId xmlns:a16="http://schemas.microsoft.com/office/drawing/2014/main" xmlns="" id="{71FB0D52-1AFA-493D-BCCD-5563D69A7671}"/>
+                <a16:creationId xmlns:a16="http://schemas.microsoft.com/office/drawing/2014/main" id="{FDC05CF1-7F26-4750-B10E-14E9A06AEB9E}"/>
               </a:ext>
             </a:extLst>
           </p:cNvPr>
-          <p:cNvSpPr>
-            <a:spLocks noGrp="1"/>
-          </p:cNvSpPr>
+          <p:cNvPicPr>
+            <a:picLocks noGrp="1" noChangeAspect="1"/>
+          </p:cNvPicPr>
           <p:nvPr>
             <p:ph idx="1"/>
           </p:nvPr>
-        </p:nvSpPr>
-        <p:spPr/>
-        <p:txBody>
-          <a:bodyPr/>
-          <a:lstStyle/>
-          <a:p>
-            <a:r>
-              <a:rPr lang="en-SG" dirty="0"/>
-              <a:t>Write the </a:t>
-            </a:r>
-            <a:r>
-              <a:rPr lang="en-US" dirty="0"/>
-              <a:t>Algorithm to find the largest of three numbers</a:t>
-            </a:r>
-          </a:p>
-        </p:txBody>
-      </p:sp>
+        </p:nvPicPr>
+        <p:blipFill>
+          <a:blip r:embed="rId2">
+            <a:extLst>
+              <a:ext uri="{28A0092B-C50C-407E-A947-70E740481C1C}">
+                <a14:useLocalDpi xmlns:a14="http://schemas.microsoft.com/office/drawing/2010/main" val="0"/>
+              </a:ext>
+            </a:extLst>
+          </a:blip>
+          <a:stretch>
+            <a:fillRect/>
+          </a:stretch>
+        </p:blipFill>
+        <p:spPr>
+          <a:xfrm>
+            <a:off x="1755774" y="1891146"/>
+            <a:ext cx="8677275" cy="4486275"/>
+          </a:xfrm>
+          <a:solidFill>
+            <a:schemeClr val="tx1"/>
+          </a:solidFill>
+        </p:spPr>
+      </p:pic>
     </p:spTree>
     <p:extLst>
       <p:ext uri="{BB962C8B-B14F-4D97-AF65-F5344CB8AC3E}">
-        <p14:creationId xmlns:p14="http://schemas.microsoft.com/office/powerpoint/2010/main" val="3667304729"/>
+        <p14:creationId xmlns:p14="http://schemas.microsoft.com/office/powerpoint/2010/main" val="3935608435"/>
       </p:ext>
     </p:extLst>
   </p:cSld>

</xml_diff>

<commit_message>
added slide for pseudocodes
</commit_message>
<xml_diff>
--- a/SPRING 20/CSE 101/Course Materials/algo_pseudo_flowcharts_part2.pptx
+++ b/SPRING 20/CSE 101/Course Materials/algo_pseudo_flowcharts_part2.pptx
@@ -344,7 +344,7 @@
           <a:p>
             <a:fld id="{2C94F50C-06F8-4A2E-ABC3-4E06C1913EFD}" type="datetimeFigureOut">
               <a:rPr lang="en-SG" smtClean="0"/>
-              <a:t>15/3/2020</a:t>
+              <a:t>17/3/2020</a:t>
             </a:fld>
             <a:endParaRPr lang="en-SG"/>
           </a:p>
@@ -640,7 +640,7 @@
           <a:p>
             <a:fld id="{2C94F50C-06F8-4A2E-ABC3-4E06C1913EFD}" type="datetimeFigureOut">
               <a:rPr lang="en-SG" smtClean="0"/>
-              <a:t>15/3/2020</a:t>
+              <a:t>17/3/2020</a:t>
             </a:fld>
             <a:endParaRPr lang="en-SG"/>
           </a:p>
@@ -899,7 +899,7 @@
           <a:p>
             <a:fld id="{2C94F50C-06F8-4A2E-ABC3-4E06C1913EFD}" type="datetimeFigureOut">
               <a:rPr lang="en-SG" smtClean="0"/>
-              <a:t>15/3/2020</a:t>
+              <a:t>17/3/2020</a:t>
             </a:fld>
             <a:endParaRPr lang="en-SG"/>
           </a:p>
@@ -1368,7 +1368,7 @@
           <a:p>
             <a:fld id="{2C94F50C-06F8-4A2E-ABC3-4E06C1913EFD}" type="datetimeFigureOut">
               <a:rPr lang="en-SG" smtClean="0"/>
-              <a:t>15/3/2020</a:t>
+              <a:t>17/3/2020</a:t>
             </a:fld>
             <a:endParaRPr lang="en-SG"/>
           </a:p>
@@ -1548,7 +1548,7 @@
           <a:p>
             <a:fld id="{2C94F50C-06F8-4A2E-ABC3-4E06C1913EFD}" type="datetimeFigureOut">
               <a:rPr lang="en-SG" smtClean="0"/>
-              <a:t>15/3/2020</a:t>
+              <a:t>17/3/2020</a:t>
             </a:fld>
             <a:endParaRPr lang="en-SG"/>
           </a:p>
@@ -2124,7 +2124,7 @@
           <a:p>
             <a:fld id="{2C94F50C-06F8-4A2E-ABC3-4E06C1913EFD}" type="datetimeFigureOut">
               <a:rPr lang="en-SG" smtClean="0"/>
-              <a:t>15/3/2020</a:t>
+              <a:t>17/3/2020</a:t>
             </a:fld>
             <a:endParaRPr lang="en-SG"/>
           </a:p>
@@ -2456,7 +2456,7 @@
           <a:p>
             <a:fld id="{2C94F50C-06F8-4A2E-ABC3-4E06C1913EFD}" type="datetimeFigureOut">
               <a:rPr lang="en-SG" smtClean="0"/>
-              <a:t>15/3/2020</a:t>
+              <a:t>17/3/2020</a:t>
             </a:fld>
             <a:endParaRPr lang="en-SG"/>
           </a:p>
@@ -2631,7 +2631,7 @@
           <a:p>
             <a:fld id="{2C94F50C-06F8-4A2E-ABC3-4E06C1913EFD}" type="datetimeFigureOut">
               <a:rPr lang="en-SG" smtClean="0"/>
-              <a:t>15/3/2020</a:t>
+              <a:t>17/3/2020</a:t>
             </a:fld>
             <a:endParaRPr lang="en-SG"/>
           </a:p>
@@ -2811,7 +2811,7 @@
           <a:p>
             <a:fld id="{2C94F50C-06F8-4A2E-ABC3-4E06C1913EFD}" type="datetimeFigureOut">
               <a:rPr lang="en-SG" smtClean="0"/>
-              <a:t>15/3/2020</a:t>
+              <a:t>17/3/2020</a:t>
             </a:fld>
             <a:endParaRPr lang="en-SG"/>
           </a:p>
@@ -2986,7 +2986,7 @@
           <a:p>
             <a:fld id="{2C94F50C-06F8-4A2E-ABC3-4E06C1913EFD}" type="datetimeFigureOut">
               <a:rPr lang="en-SG" smtClean="0"/>
-              <a:t>15/3/2020</a:t>
+              <a:t>17/3/2020</a:t>
             </a:fld>
             <a:endParaRPr lang="en-SG"/>
           </a:p>
@@ -3243,7 +3243,7 @@
           <a:p>
             <a:fld id="{2C94F50C-06F8-4A2E-ABC3-4E06C1913EFD}" type="datetimeFigureOut">
               <a:rPr lang="en-SG" smtClean="0"/>
-              <a:t>15/3/2020</a:t>
+              <a:t>17/3/2020</a:t>
             </a:fld>
             <a:endParaRPr lang="en-SG"/>
           </a:p>
@@ -3540,7 +3540,7 @@
           <a:p>
             <a:fld id="{2C94F50C-06F8-4A2E-ABC3-4E06C1913EFD}" type="datetimeFigureOut">
               <a:rPr lang="en-SG" smtClean="0"/>
-              <a:t>15/3/2020</a:t>
+              <a:t>17/3/2020</a:t>
             </a:fld>
             <a:endParaRPr lang="en-SG"/>
           </a:p>
@@ -3970,7 +3970,7 @@
           <a:p>
             <a:fld id="{2C94F50C-06F8-4A2E-ABC3-4E06C1913EFD}" type="datetimeFigureOut">
               <a:rPr lang="en-SG" smtClean="0"/>
-              <a:t>15/3/2020</a:t>
+              <a:t>17/3/2020</a:t>
             </a:fld>
             <a:endParaRPr lang="en-SG"/>
           </a:p>
@@ -4088,7 +4088,7 @@
           <a:p>
             <a:fld id="{2C94F50C-06F8-4A2E-ABC3-4E06C1913EFD}" type="datetimeFigureOut">
               <a:rPr lang="en-SG" smtClean="0"/>
-              <a:t>15/3/2020</a:t>
+              <a:t>17/3/2020</a:t>
             </a:fld>
             <a:endParaRPr lang="en-SG"/>
           </a:p>
@@ -4183,7 +4183,7 @@
           <a:p>
             <a:fld id="{2C94F50C-06F8-4A2E-ABC3-4E06C1913EFD}" type="datetimeFigureOut">
               <a:rPr lang="en-SG" smtClean="0"/>
-              <a:t>15/3/2020</a:t>
+              <a:t>17/3/2020</a:t>
             </a:fld>
             <a:endParaRPr lang="en-SG"/>
           </a:p>
@@ -4466,7 +4466,7 @@
           <a:p>
             <a:fld id="{2C94F50C-06F8-4A2E-ABC3-4E06C1913EFD}" type="datetimeFigureOut">
               <a:rPr lang="en-SG" smtClean="0"/>
-              <a:t>15/3/2020</a:t>
+              <a:t>17/3/2020</a:t>
             </a:fld>
             <a:endParaRPr lang="en-SG"/>
           </a:p>
@@ -4757,7 +4757,7 @@
           <a:p>
             <a:fld id="{2C94F50C-06F8-4A2E-ABC3-4E06C1913EFD}" type="datetimeFigureOut">
               <a:rPr lang="en-SG" smtClean="0"/>
-              <a:t>15/3/2020</a:t>
+              <a:t>17/3/2020</a:t>
             </a:fld>
             <a:endParaRPr lang="en-SG"/>
           </a:p>
@@ -4988,7 +4988,7 @@
           <a:p>
             <a:fld id="{2C94F50C-06F8-4A2E-ABC3-4E06C1913EFD}" type="datetimeFigureOut">
               <a:rPr lang="en-SG" smtClean="0"/>
-              <a:t>15/3/2020</a:t>
+              <a:t>17/3/2020</a:t>
             </a:fld>
             <a:endParaRPr lang="en-SG"/>
           </a:p>
@@ -6299,9 +6299,8 @@
               </a:ext>
             </a:extLst>
           </a:blip>
-          <a:stretch>
-            <a:fillRect/>
-          </a:stretch>
+          <a:srcRect/>
+          <a:stretch/>
         </p:blipFill>
         <p:spPr>
           <a:xfrm>
@@ -6371,8 +6370,8 @@
           </a:p>
         </p:txBody>
       </p:sp>
-      <mc:AlternateContent xmlns:mc="http://schemas.openxmlformats.org/markup-compatibility/2006">
-        <mc:Choice xmlns:a14="http://schemas.microsoft.com/office/drawing/2010/main" Requires="a14">
+      <mc:AlternateContent xmlns:mc="http://schemas.openxmlformats.org/markup-compatibility/2006" xmlns:a14="http://schemas.microsoft.com/office/drawing/2010/main">
+        <mc:Choice Requires="a14">
           <p:sp>
             <p:nvSpPr>
               <p:cNvPr id="3" name="Content Placeholder 2">
@@ -6469,7 +6468,7 @@
             </p:txBody>
           </p:sp>
         </mc:Choice>
-        <mc:Fallback>
+        <mc:Fallback xmlns="">
           <p:sp>
             <p:nvSpPr>
               <p:cNvPr id="3" name="Content Placeholder 2">
@@ -6747,8 +6746,8 @@
           </a:p>
         </p:txBody>
       </p:sp>
-      <mc:AlternateContent xmlns:mc="http://schemas.openxmlformats.org/markup-compatibility/2006">
-        <mc:Choice xmlns:a14="http://schemas.microsoft.com/office/drawing/2010/main" Requires="a14">
+      <mc:AlternateContent xmlns:mc="http://schemas.openxmlformats.org/markup-compatibility/2006" xmlns:a14="http://schemas.microsoft.com/office/drawing/2010/main">
+        <mc:Choice Requires="a14">
           <p:sp>
             <p:nvSpPr>
               <p:cNvPr id="3" name="Content Placeholder 2">
@@ -6799,7 +6798,7 @@
             </p:txBody>
           </p:sp>
         </mc:Choice>
-        <mc:Fallback>
+        <mc:Fallback xmlns="">
           <p:sp>
             <p:nvSpPr>
               <p:cNvPr id="3" name="Content Placeholder 2">
@@ -6897,8 +6896,8 @@
           </a:p>
         </p:txBody>
       </p:sp>
-      <mc:AlternateContent xmlns:mc="http://schemas.openxmlformats.org/markup-compatibility/2006">
-        <mc:Choice xmlns:a14="http://schemas.microsoft.com/office/drawing/2010/main" Requires="a14">
+      <mc:AlternateContent xmlns:mc="http://schemas.openxmlformats.org/markup-compatibility/2006" xmlns:a14="http://schemas.microsoft.com/office/drawing/2010/main">
+        <mc:Choice Requires="a14">
           <p:sp>
             <p:nvSpPr>
               <p:cNvPr id="3" name="Content Placeholder 2">
@@ -6966,7 +6965,7 @@
             </p:txBody>
           </p:sp>
         </mc:Choice>
-        <mc:Fallback>
+        <mc:Fallback xmlns="">
           <p:sp>
             <p:nvSpPr>
               <p:cNvPr id="3" name="Content Placeholder 2">
@@ -7064,8 +7063,8 @@
           </a:p>
         </p:txBody>
       </p:sp>
-      <mc:AlternateContent xmlns:mc="http://schemas.openxmlformats.org/markup-compatibility/2006">
-        <mc:Choice xmlns:a14="http://schemas.microsoft.com/office/drawing/2010/main" Requires="a14">
+      <mc:AlternateContent xmlns:mc="http://schemas.openxmlformats.org/markup-compatibility/2006" xmlns:a14="http://schemas.microsoft.com/office/drawing/2010/main">
+        <mc:Choice Requires="a14">
           <p:sp>
             <p:nvSpPr>
               <p:cNvPr id="3" name="Content Placeholder 2">
@@ -7228,7 +7227,7 @@
             </p:txBody>
           </p:sp>
         </mc:Choice>
-        <mc:Fallback>
+        <mc:Fallback xmlns="">
           <p:sp>
             <p:nvSpPr>
               <p:cNvPr id="3" name="Content Placeholder 2">

</xml_diff>